<commit_message>
work on presentation for workshop
Add more info about OneGeology and GeoSciML portrayal
</commit_message>
<xml_diff>
--- a/OneGeologyWebinar/OneGeology.pptx
+++ b/OneGeologyWebinar/OneGeology.pptx
@@ -7,19 +7,23 @@
   <p:sldIdLst>
     <p:sldId id="272" r:id="rId2"/>
     <p:sldId id="265" r:id="rId3"/>
-    <p:sldId id="259" r:id="rId4"/>
-    <p:sldId id="260" r:id="rId5"/>
-    <p:sldId id="258" r:id="rId6"/>
-    <p:sldId id="261" r:id="rId7"/>
-    <p:sldId id="262" r:id="rId8"/>
-    <p:sldId id="264" r:id="rId9"/>
-    <p:sldId id="266" r:id="rId10"/>
-    <p:sldId id="269" r:id="rId11"/>
-    <p:sldId id="267" r:id="rId12"/>
-    <p:sldId id="268" r:id="rId13"/>
-    <p:sldId id="271" r:id="rId14"/>
-    <p:sldId id="270" r:id="rId15"/>
-    <p:sldId id="257" r:id="rId16"/>
+    <p:sldId id="274" r:id="rId4"/>
+    <p:sldId id="273" r:id="rId5"/>
+    <p:sldId id="275" r:id="rId6"/>
+    <p:sldId id="259" r:id="rId7"/>
+    <p:sldId id="260" r:id="rId8"/>
+    <p:sldId id="258" r:id="rId9"/>
+    <p:sldId id="261" r:id="rId10"/>
+    <p:sldId id="276" r:id="rId11"/>
+    <p:sldId id="262" r:id="rId12"/>
+    <p:sldId id="264" r:id="rId13"/>
+    <p:sldId id="266" r:id="rId14"/>
+    <p:sldId id="269" r:id="rId15"/>
+    <p:sldId id="267" r:id="rId16"/>
+    <p:sldId id="268" r:id="rId17"/>
+    <p:sldId id="271" r:id="rId18"/>
+    <p:sldId id="270" r:id="rId19"/>
+    <p:sldId id="257" r:id="rId20"/>
   </p:sldIdLst>
   <p:sldSz cx="9144000" cy="6858000" type="screen4x3"/>
   <p:notesSz cx="6858000" cy="9144000"/>
@@ -302,7 +306,7 @@
           <a:p>
             <a:fld id="{CDE0F6D6-1B8E-4FD6-B6CD-059E046AA7F5}" type="datetimeFigureOut">
               <a:rPr lang="en-US" smtClean="0"/>
-              <a:t>8/23/2013</a:t>
+              <a:t>8/26/2013</a:t>
             </a:fld>
             <a:endParaRPr lang="en-US"/>
           </a:p>
@@ -472,7 +476,7 @@
           <a:p>
             <a:fld id="{CDE0F6D6-1B8E-4FD6-B6CD-059E046AA7F5}" type="datetimeFigureOut">
               <a:rPr lang="en-US" smtClean="0"/>
-              <a:t>8/23/2013</a:t>
+              <a:t>8/26/2013</a:t>
             </a:fld>
             <a:endParaRPr lang="en-US"/>
           </a:p>
@@ -652,7 +656,7 @@
           <a:p>
             <a:fld id="{CDE0F6D6-1B8E-4FD6-B6CD-059E046AA7F5}" type="datetimeFigureOut">
               <a:rPr lang="en-US" smtClean="0"/>
-              <a:t>8/23/2013</a:t>
+              <a:t>8/26/2013</a:t>
             </a:fld>
             <a:endParaRPr lang="en-US"/>
           </a:p>
@@ -822,7 +826,7 @@
           <a:p>
             <a:fld id="{CDE0F6D6-1B8E-4FD6-B6CD-059E046AA7F5}" type="datetimeFigureOut">
               <a:rPr lang="en-US" smtClean="0"/>
-              <a:t>8/23/2013</a:t>
+              <a:t>8/26/2013</a:t>
             </a:fld>
             <a:endParaRPr lang="en-US"/>
           </a:p>
@@ -1068,7 +1072,7 @@
           <a:p>
             <a:fld id="{CDE0F6D6-1B8E-4FD6-B6CD-059E046AA7F5}" type="datetimeFigureOut">
               <a:rPr lang="en-US" smtClean="0"/>
-              <a:t>8/23/2013</a:t>
+              <a:t>8/26/2013</a:t>
             </a:fld>
             <a:endParaRPr lang="en-US"/>
           </a:p>
@@ -1356,7 +1360,7 @@
           <a:p>
             <a:fld id="{CDE0F6D6-1B8E-4FD6-B6CD-059E046AA7F5}" type="datetimeFigureOut">
               <a:rPr lang="en-US" smtClean="0"/>
-              <a:t>8/23/2013</a:t>
+              <a:t>8/26/2013</a:t>
             </a:fld>
             <a:endParaRPr lang="en-US"/>
           </a:p>
@@ -1778,7 +1782,7 @@
           <a:p>
             <a:fld id="{CDE0F6D6-1B8E-4FD6-B6CD-059E046AA7F5}" type="datetimeFigureOut">
               <a:rPr lang="en-US" smtClean="0"/>
-              <a:t>8/23/2013</a:t>
+              <a:t>8/26/2013</a:t>
             </a:fld>
             <a:endParaRPr lang="en-US"/>
           </a:p>
@@ -1896,7 +1900,7 @@
           <a:p>
             <a:fld id="{CDE0F6D6-1B8E-4FD6-B6CD-059E046AA7F5}" type="datetimeFigureOut">
               <a:rPr lang="en-US" smtClean="0"/>
-              <a:t>8/23/2013</a:t>
+              <a:t>8/26/2013</a:t>
             </a:fld>
             <a:endParaRPr lang="en-US"/>
           </a:p>
@@ -1991,7 +1995,7 @@
           <a:p>
             <a:fld id="{CDE0F6D6-1B8E-4FD6-B6CD-059E046AA7F5}" type="datetimeFigureOut">
               <a:rPr lang="en-US" smtClean="0"/>
-              <a:t>8/23/2013</a:t>
+              <a:t>8/26/2013</a:t>
             </a:fld>
             <a:endParaRPr lang="en-US"/>
           </a:p>
@@ -2268,7 +2272,7 @@
           <a:p>
             <a:fld id="{CDE0F6D6-1B8E-4FD6-B6CD-059E046AA7F5}" type="datetimeFigureOut">
               <a:rPr lang="en-US" smtClean="0"/>
-              <a:t>8/23/2013</a:t>
+              <a:t>8/26/2013</a:t>
             </a:fld>
             <a:endParaRPr lang="en-US"/>
           </a:p>
@@ -2521,7 +2525,7 @@
           <a:p>
             <a:fld id="{CDE0F6D6-1B8E-4FD6-B6CD-059E046AA7F5}" type="datetimeFigureOut">
               <a:rPr lang="en-US" smtClean="0"/>
-              <a:t>8/23/2013</a:t>
+              <a:t>8/26/2013</a:t>
             </a:fld>
             <a:endParaRPr lang="en-US"/>
           </a:p>
@@ -2754,7 +2758,7 @@
           <a:p>
             <a:fld id="{CDE0F6D6-1B8E-4FD6-B6CD-059E046AA7F5}" type="datetimeFigureOut">
               <a:rPr lang="en-US" smtClean="0"/>
-              <a:t>8/23/2013</a:t>
+              <a:t>8/26/2013</a:t>
             </a:fld>
             <a:endParaRPr lang="en-US"/>
           </a:p>
@@ -3142,22 +3146,22 @@
         <p:spPr/>
         <p:txBody>
           <a:bodyPr>
-            <a:normAutofit fontScale="90000"/>
+            <a:noAutofit/>
           </a:bodyPr>
           <a:lstStyle/>
           <a:p>
             <a:r>
-              <a:rPr lang="en-US" i="1" smtClean="0"/>
+              <a:rPr lang="en-US" sz="4800" b="1" i="1" dirty="0" smtClean="0"/>
               <a:t>GeoSciML-Portrayal and </a:t>
             </a:r>
             <a:br>
-              <a:rPr lang="en-US" i="1" smtClean="0"/>
+              <a:rPr lang="en-US" sz="4800" b="1" i="1" dirty="0" smtClean="0"/>
             </a:br>
             <a:r>
-              <a:rPr lang="en-US" i="1" smtClean="0"/>
-              <a:t>USA OneGeology</a:t>
-            </a:r>
-            <a:endParaRPr lang="en-US"/>
+              <a:rPr lang="en-US" sz="4800" b="1" i="1" dirty="0" smtClean="0"/>
+              <a:t>OneGeology USA</a:t>
+            </a:r>
+            <a:endParaRPr lang="en-US" sz="4800" b="1" dirty="0"/>
           </a:p>
         </p:txBody>
       </p:sp>
@@ -3179,7 +3183,7 @@
             <a:pPr marL="0" indent="0">
               <a:buNone/>
             </a:pPr>
-            <a:endParaRPr lang="en-US" smtClean="0">
+            <a:endParaRPr lang="en-US" dirty="0" smtClean="0">
               <a:hlinkClick r:id="rId2"/>
             </a:endParaRPr>
           </a:p>
@@ -3188,10 +3192,10 @@
               <a:buNone/>
             </a:pPr>
             <a:r>
-              <a:rPr lang="en-US" smtClean="0"/>
+              <a:rPr lang="en-US" dirty="0" smtClean="0"/>
               <a:t>resources:</a:t>
             </a:r>
-            <a:endParaRPr lang="en-US" smtClean="0">
+            <a:endParaRPr lang="en-US" dirty="0" smtClean="0">
               <a:hlinkClick r:id="rId2"/>
             </a:endParaRPr>
           </a:p>
@@ -3200,72 +3204,66 @@
               <a:buNone/>
             </a:pPr>
             <a:r>
-              <a:rPr lang="en-US" smtClean="0">
+              <a:rPr lang="en-US" dirty="0" smtClean="0">
                 <a:hlinkClick r:id="rId2"/>
               </a:rPr>
               <a:t>https</a:t>
             </a:r>
             <a:r>
-              <a:rPr lang="en-US">
+              <a:rPr lang="en-US" dirty="0">
                 <a:hlinkClick r:id="rId2"/>
               </a:rPr>
               <a:t>://</a:t>
             </a:r>
             <a:r>
-              <a:rPr lang="en-US" smtClean="0">
+              <a:rPr lang="en-US" dirty="0" smtClean="0">
                 <a:hlinkClick r:id="rId2"/>
               </a:rPr>
               <a:t>github.com/usgin-models/GeoSciML-Portrayal/archive/master.zip</a:t>
             </a:r>
-            <a:endParaRPr lang="en-US" smtClean="0"/>
+            <a:endParaRPr lang="en-US" dirty="0" smtClean="0"/>
           </a:p>
           <a:p>
             <a:pPr marL="0" indent="0">
               <a:buNone/>
             </a:pPr>
-            <a:endParaRPr lang="en-US" smtClean="0"/>
+            <a:endParaRPr lang="en-US" dirty="0" smtClean="0"/>
           </a:p>
           <a:p>
             <a:pPr marL="0" indent="0">
               <a:buNone/>
             </a:pPr>
             <a:r>
-              <a:rPr lang="en-US" smtClean="0"/>
+              <a:rPr lang="en-US" dirty="0" smtClean="0"/>
               <a:t>webinar materials:</a:t>
             </a:r>
-            <a:endParaRPr lang="en-US"/>
+            <a:endParaRPr lang="en-US" dirty="0"/>
           </a:p>
           <a:p>
             <a:pPr marL="0" indent="0">
               <a:buNone/>
             </a:pPr>
             <a:r>
-              <a:rPr lang="en-US">
+              <a:rPr lang="en-US" dirty="0">
                 <a:hlinkClick r:id="rId3"/>
               </a:rPr>
-              <a:t>https</a:t>
-            </a:r>
-            <a:r>
-              <a:rPr lang="en-US">
-                <a:hlinkClick r:id="rId3"/>
-              </a:rPr>
-              <a:t>://</a:t>
-            </a:r>
-            <a:r>
-              <a:rPr lang="en-US" smtClean="0">
+              <a:t>https://</a:t>
+            </a:r>
+            <a:r>
+              <a:rPr lang="en-US" dirty="0" smtClean="0">
                 <a:hlinkClick r:id="rId3"/>
               </a:rPr>
               <a:t>github.com/usgin/Workshops/archive/master.zip</a:t>
             </a:r>
             <a:r>
-              <a:rPr lang="en-US" smtClean="0"/>
+              <a:rPr lang="en-US" dirty="0" smtClean="0"/>
               <a:t>  - </a:t>
             </a:r>
             <a:r>
-              <a:rPr lang="en-US" i="1" smtClean="0"/>
+              <a:rPr lang="en-US" i="1" dirty="0" err="1" smtClean="0"/>
               <a:t>OneGeologyWebinar</a:t>
             </a:r>
-            <a:endParaRPr lang="en-US"/>
+            <a:endParaRPr lang="en-US" dirty="0"/>
           </a:p>
         </p:txBody>
       </p:sp>
@@ -3311,17 +3309,14 @@
         </p:nvSpPr>
         <p:spPr/>
         <p:txBody>
-          <a:bodyPr>
-            <a:normAutofit fontScale="90000"/>
-          </a:bodyPr>
-          <a:lstStyle/>
-          <a:p>
-            <a:pPr algn="l"/>
-            <a:r>
-              <a:rPr lang="en-US" i="1" smtClean="0"/>
-              <a:t>Layer-Level Metadata Requirements</a:t>
-            </a:r>
-            <a:endParaRPr lang="en-US"/>
+          <a:bodyPr/>
+          <a:lstStyle/>
+          <a:p>
+            <a:r>
+              <a:rPr lang="en-US" dirty="0" smtClean="0"/>
+              <a:t>GeoSciML portrayal</a:t>
+            </a:r>
+            <a:endParaRPr lang="en-US" dirty="0"/>
           </a:p>
         </p:txBody>
       </p:sp>
@@ -3337,181 +3332,44 @@
         </p:nvSpPr>
         <p:spPr/>
         <p:txBody>
-          <a:bodyPr>
-            <a:normAutofit fontScale="77500" lnSpcReduction="20000"/>
-          </a:bodyPr>
-          <a:lstStyle/>
-          <a:p>
-            <a:r>
-              <a:rPr lang="en-US" smtClean="0"/>
-              <a:t>Abstract</a:t>
-            </a:r>
-          </a:p>
-          <a:p>
-            <a:r>
-              <a:rPr lang="en-US" smtClean="0"/>
-              <a:t>Keywords</a:t>
-            </a:r>
-          </a:p>
-          <a:p>
-            <a:pPr lvl="1"/>
-            <a:r>
-              <a:rPr lang="en-US"/>
-              <a:t>continent@North </a:t>
-            </a:r>
-            <a:r>
-              <a:rPr lang="en-US" smtClean="0"/>
-              <a:t>America</a:t>
-            </a:r>
-          </a:p>
-          <a:p>
-            <a:pPr lvl="1"/>
-            <a:r>
-              <a:rPr lang="en-US" smtClean="0"/>
-              <a:t>geographicarea@Arizona</a:t>
-            </a:r>
-          </a:p>
-          <a:p>
-            <a:pPr lvl="1"/>
-            <a:r>
-              <a:rPr lang="en-US" smtClean="0"/>
-              <a:t>dataprovider@AZGS</a:t>
-            </a:r>
-          </a:p>
-          <a:p>
-            <a:pPr lvl="1"/>
-            <a:r>
-              <a:rPr lang="en-US" smtClean="0"/>
-              <a:t>serviceprovider@AZGS</a:t>
-            </a:r>
-          </a:p>
-          <a:p>
-            <a:pPr lvl="1"/>
-            <a:r>
-              <a:rPr lang="en-US" smtClean="0"/>
-              <a:t>3-star WMS: Geosciml_portrayal_age_or_litho_queryable</a:t>
-            </a:r>
-            <a:endParaRPr lang="en-US"/>
-          </a:p>
-          <a:p>
-            <a:pPr lvl="1"/>
-            <a:r>
-              <a:rPr lang="en-US" smtClean="0"/>
-              <a:t>3-star WFS:  WFSgsml31filter_age_litho   </a:t>
-            </a:r>
-          </a:p>
-          <a:p>
-            <a:r>
-              <a:rPr lang="en-US" smtClean="0"/>
-              <a:t>Bounding Boxes</a:t>
-            </a:r>
-          </a:p>
-          <a:p>
-            <a:r>
-              <a:rPr lang="en-US" smtClean="0"/>
-              <a:t>SRS</a:t>
-            </a:r>
-          </a:p>
-          <a:p>
-            <a:r>
-              <a:rPr lang="en-US" smtClean="0"/>
-              <a:t>MetadataURL</a:t>
-            </a:r>
-          </a:p>
-          <a:p>
-            <a:r>
-              <a:rPr lang="en-US" smtClean="0"/>
-              <a:t>ReadableLengendGraphicURL</a:t>
-            </a:r>
-          </a:p>
-          <a:p>
-            <a:pPr marL="0" indent="0">
-              <a:buNone/>
-            </a:pPr>
-            <a:endParaRPr lang="en-US"/>
-          </a:p>
-          <a:p>
-            <a:pPr marL="0" indent="0">
-              <a:buNone/>
-            </a:pPr>
-            <a:endParaRPr lang="en-US" b="1" i="1"/>
-          </a:p>
-        </p:txBody>
-      </p:sp>
-      <p:sp>
-        <p:nvSpPr>
-          <p:cNvPr id="4" name="TextBox 3"/>
-          <p:cNvSpPr txBox="1"/>
-          <p:nvPr/>
-        </p:nvSpPr>
-        <p:spPr>
-          <a:xfrm>
-            <a:off x="1752600" y="6019800"/>
-            <a:ext cx="7162800" cy="892552"/>
-          </a:xfrm>
-          <a:prstGeom prst="rect">
-            <a:avLst/>
-          </a:prstGeom>
-          <a:noFill/>
-        </p:spPr>
-        <p:txBody>
-          <a:bodyPr wrap="square" rtlCol="0">
-            <a:spAutoFit/>
-          </a:bodyPr>
-          <a:lstStyle/>
-          <a:p>
-            <a:r>
-              <a:rPr lang="en-US" sz="2600" b="1" i="1" smtClean="0"/>
-              <a:t>Will need to make Custom Capabilities files to accommodate the metadata requirements!</a:t>
-            </a:r>
-            <a:endParaRPr lang="en-US" sz="2600" b="1" i="1"/>
-          </a:p>
-        </p:txBody>
-      </p:sp>
-      <p:sp>
-        <p:nvSpPr>
-          <p:cNvPr id="5" name="Right Arrow 4"/>
-          <p:cNvSpPr/>
-          <p:nvPr/>
-        </p:nvSpPr>
-        <p:spPr>
-          <a:xfrm>
-            <a:off x="304800" y="6172200"/>
-            <a:ext cx="1295400" cy="457200"/>
-          </a:xfrm>
-          <a:prstGeom prst="rightArrow">
-            <a:avLst/>
-          </a:prstGeom>
-        </p:spPr>
-        <p:style>
-          <a:lnRef idx="2">
-            <a:schemeClr val="accent1">
-              <a:shade val="50000"/>
-            </a:schemeClr>
-          </a:lnRef>
-          <a:fillRef idx="1">
-            <a:schemeClr val="accent1"/>
-          </a:fillRef>
-          <a:effectRef idx="0">
-            <a:schemeClr val="accent1"/>
-          </a:effectRef>
-          <a:fontRef idx="minor">
-            <a:schemeClr val="lt1"/>
-          </a:fontRef>
-        </p:style>
-        <p:txBody>
-          <a:bodyPr rtlCol="0" anchor="ctr"/>
-          <a:lstStyle/>
-          <a:p>
-            <a:pPr algn="ctr"/>
-            <a:endParaRPr lang="en-US"/>
+          <a:bodyPr/>
+          <a:lstStyle/>
+          <a:p>
+            <a:r>
+              <a:rPr lang="en-US" dirty="0" smtClean="0"/>
+              <a:t>Simple XML schema for core geologic map information</a:t>
+            </a:r>
+          </a:p>
+          <a:p>
+            <a:r>
+              <a:rPr lang="en-US" dirty="0" smtClean="0"/>
+              <a:t>Focus on simple map display and </a:t>
+            </a:r>
+            <a:r>
+              <a:rPr lang="en-US" dirty="0" err="1" smtClean="0"/>
+              <a:t>mashup</a:t>
+            </a:r>
+            <a:endParaRPr lang="en-US" dirty="0" smtClean="0"/>
+          </a:p>
+          <a:p>
+            <a:r>
+              <a:rPr lang="en-US" dirty="0" smtClean="0"/>
+              <a:t>Text fields for users to read</a:t>
+            </a:r>
+          </a:p>
+          <a:p>
+            <a:r>
+              <a:rPr lang="en-US" dirty="0" smtClean="0"/>
+              <a:t>Standard feature type, age, lithology vocabularies for harmonized map legends</a:t>
+            </a:r>
+            <a:endParaRPr lang="en-US" dirty="0"/>
           </a:p>
         </p:txBody>
       </p:sp>
     </p:spTree>
     <p:extLst>
       <p:ext uri="{BB962C8B-B14F-4D97-AF65-F5344CB8AC3E}">
-        <p14:creationId xmlns:p14="http://schemas.microsoft.com/office/powerpoint/2010/main" val="400006958"/>
+        <p14:creationId xmlns:p14="http://schemas.microsoft.com/office/powerpoint/2010/main" val="3601555824"/>
       </p:ext>
     </p:extLst>
   </p:cSld>
@@ -3556,9 +3414,9 @@
             <a:pPr algn="l"/>
             <a:r>
               <a:rPr lang="en-US" i="1" smtClean="0"/>
-              <a:t>Custom Capabilities, WMS</a:t>
-            </a:r>
-            <a:endParaRPr lang="en-US"/>
+              <a:t>Access GeoSciML-Portrayal schema</a:t>
+            </a:r>
+            <a:endParaRPr lang="en-US" i="1"/>
           </a:p>
         </p:txBody>
       </p:sp>
@@ -3579,156 +3437,143 @@
           </a:bodyPr>
           <a:lstStyle/>
           <a:p>
-            <a:r>
-              <a:rPr lang="en-US"/>
-              <a:t>Deploy your WMS service, entering in </a:t>
-            </a:r>
-            <a:r>
-              <a:rPr lang="en-US"/>
-              <a:t>all </a:t>
-            </a:r>
-            <a:r>
-              <a:rPr lang="en-US" smtClean="0"/>
-              <a:t>metadata</a:t>
-            </a:r>
-          </a:p>
-          <a:p>
-            <a:r>
-              <a:rPr lang="en-US" smtClean="0"/>
-              <a:t>Open capabilities documents; </a:t>
-            </a:r>
-            <a:r>
-              <a:rPr lang="en-US" sz="2800" smtClean="0">
-                <a:solidFill>
-                  <a:schemeClr val="tx2"/>
-                </a:solidFill>
+            <a:pPr marL="0" indent="0">
+              <a:buNone/>
+            </a:pPr>
+            <a:r>
+              <a:rPr lang="en-US" b="1" dirty="0" smtClean="0"/>
+              <a:t>Normative</a:t>
+            </a:r>
+            <a:r>
+              <a:rPr lang="en-US" dirty="0" smtClean="0"/>
+              <a:t> schema location:</a:t>
+            </a:r>
+          </a:p>
+          <a:p>
+            <a:pPr marL="0" indent="0">
+              <a:buNone/>
+            </a:pPr>
+            <a:r>
+              <a:rPr lang="en-US" sz="2600" dirty="0">
+                <a:hlinkClick r:id="rId2"/>
               </a:rPr>
-              <a:t>C</a:t>
-            </a:r>
-            <a:r>
-              <a:rPr lang="en-US" sz="2800">
-                <a:solidFill>
-                  <a:schemeClr val="tx2"/>
-                </a:solidFill>
+              <a:t>http://</a:t>
+            </a:r>
+            <a:r>
+              <a:rPr lang="en-US" sz="2600" dirty="0" smtClean="0">
+                <a:hlinkClick r:id="rId2"/>
               </a:rPr>
-              <a:t>:\arcgisserver\arcgisoutput\&lt;someservicename</a:t>
-            </a:r>
-            <a:r>
-              <a:rPr lang="en-US" sz="2800">
-                <a:solidFill>
-                  <a:schemeClr val="tx2"/>
-                </a:solidFill>
+              <a:t>schemas.geosciml.org/geosciml-portrayal/2.0/geosciml-portrayal.xsd</a:t>
+            </a:r>
+            <a:endParaRPr lang="en-US" sz="2600" dirty="0" smtClean="0"/>
+          </a:p>
+          <a:p>
+            <a:pPr marL="0" indent="0">
+              <a:buNone/>
+            </a:pPr>
+            <a:endParaRPr lang="en-US" dirty="0">
+              <a:hlinkClick r:id="rId3"/>
+            </a:endParaRPr>
+          </a:p>
+          <a:p>
+            <a:pPr marL="0" indent="0">
+              <a:buNone/>
+            </a:pPr>
+            <a:r>
+              <a:rPr lang="en-US" dirty="0" smtClean="0"/>
+              <a:t>See Also, for more documentation:</a:t>
+            </a:r>
+            <a:endParaRPr lang="en-US" dirty="0">
+              <a:hlinkClick r:id="rId3"/>
+            </a:endParaRPr>
+          </a:p>
+          <a:p>
+            <a:pPr marL="0" indent="0">
+              <a:buNone/>
+            </a:pPr>
+            <a:r>
+              <a:rPr lang="en-US" dirty="0" smtClean="0">
+                <a:hlinkClick r:id="rId3"/>
               </a:rPr>
-              <a:t>&gt;_</a:t>
-            </a:r>
-            <a:r>
-              <a:rPr lang="en-US" sz="2800" smtClean="0">
-                <a:solidFill>
-                  <a:schemeClr val="tx2"/>
-                </a:solidFill>
+              <a:t>https</a:t>
+            </a:r>
+            <a:r>
+              <a:rPr lang="en-US" dirty="0" smtClean="0">
+                <a:hlinkClick r:id="rId3"/>
               </a:rPr>
-              <a:t>MapServer</a:t>
-            </a:r>
-          </a:p>
-          <a:p>
-            <a:pPr lvl="1"/>
-            <a:r>
-              <a:rPr lang="en-US"/>
-              <a:t>GetCapabilities100.xml</a:t>
-            </a:r>
-          </a:p>
-          <a:p>
-            <a:pPr lvl="1"/>
-            <a:r>
-              <a:rPr lang="en-US"/>
-              <a:t>GetCapabilities110.xml</a:t>
-            </a:r>
-          </a:p>
-          <a:p>
-            <a:r>
-              <a:rPr lang="en-US"/>
-              <a:t>Add </a:t>
-            </a:r>
-            <a:r>
-              <a:rPr lang="en-US" smtClean="0"/>
-              <a:t>additional required metadata</a:t>
-            </a:r>
-          </a:p>
-          <a:p>
-            <a:r>
-              <a:rPr lang="en-US" smtClean="0"/>
-              <a:t>Rename documents and place in </a:t>
-            </a:r>
-            <a:r>
-              <a:rPr lang="en-US"/>
-              <a:t>local file location that is </a:t>
-            </a:r>
-            <a:r>
-              <a:rPr lang="en-US"/>
-              <a:t>web </a:t>
-            </a:r>
-            <a:r>
-              <a:rPr lang="en-US" smtClean="0"/>
-              <a:t>accessible; </a:t>
-            </a:r>
-            <a:r>
-              <a:rPr lang="en-US">
-                <a:solidFill>
-                  <a:schemeClr val="tx2"/>
-                </a:solidFill>
+              <a:t>://github.com/usgin-models/GeoSciML-Portrayal</a:t>
+            </a:r>
+            <a:endParaRPr lang="en-US" dirty="0" smtClean="0"/>
+          </a:p>
+          <a:p>
+            <a:pPr marL="0" indent="0">
+              <a:buNone/>
+            </a:pPr>
+            <a:endParaRPr lang="en-US" dirty="0"/>
+          </a:p>
+          <a:p>
+            <a:pPr marL="0" indent="0">
+              <a:buNone/>
+            </a:pPr>
+            <a:r>
+              <a:rPr lang="en-US" sz="2800" dirty="0" smtClean="0">
+                <a:hlinkClick r:id="rId4"/>
               </a:rPr>
-              <a:t>C://…(dir)…/inetpub/wwwroot/[</a:t>
-            </a:r>
-            <a:r>
-              <a:rPr lang="en-US">
-                <a:solidFill>
-                  <a:schemeClr val="tx2"/>
-                </a:solidFill>
+              <a:t>http</a:t>
+            </a:r>
+            <a:r>
+              <a:rPr lang="en-US" sz="2800" dirty="0" smtClean="0">
+                <a:hlinkClick r:id="rId4"/>
               </a:rPr>
-              <a:t>ServiceTitle</a:t>
-            </a:r>
-            <a:r>
-              <a:rPr lang="en-US" smtClean="0">
-                <a:solidFill>
-                  <a:schemeClr val="tx2"/>
-                </a:solidFill>
+              <a:t>://schemas.usgin.org/models/#geosciml-portrayal-units</a:t>
+            </a:r>
+            <a:endParaRPr lang="en-US" sz="2800" dirty="0" smtClean="0"/>
+          </a:p>
+          <a:p>
+            <a:pPr marL="0" indent="0">
+              <a:buNone/>
+            </a:pPr>
+            <a:r>
+              <a:rPr lang="en-US" sz="2800" dirty="0" smtClean="0">
+                <a:hlinkClick r:id="rId5"/>
               </a:rPr>
-              <a:t>]</a:t>
-            </a:r>
-          </a:p>
-          <a:p>
-            <a:pPr lvl="1"/>
-            <a:r>
-              <a:rPr lang="en-US" smtClean="0"/>
-              <a:t>onegeologyWMS-111.xml</a:t>
-            </a:r>
-          </a:p>
-          <a:p>
-            <a:pPr lvl="1"/>
-            <a:r>
-              <a:rPr lang="en-US"/>
-              <a:t>onegeologyWMS-130.xml</a:t>
-            </a:r>
-          </a:p>
-          <a:p>
-            <a:pPr lvl="1"/>
-            <a:endParaRPr lang="en-US"/>
+              <a:t>http://schemas.usgin.org/models/#geosciml-portrayal-contacts</a:t>
+            </a:r>
+            <a:endParaRPr lang="en-US" sz="2800" dirty="0" smtClean="0"/>
           </a:p>
           <a:p>
             <a:pPr marL="0" indent="0">
               <a:buNone/>
             </a:pPr>
-            <a:endParaRPr lang="en-US"/>
-          </a:p>
-          <a:p>
-            <a:endParaRPr lang="en-US"/>
+            <a:r>
+              <a:rPr lang="en-US" sz="2800" dirty="0" smtClean="0">
+                <a:hlinkClick r:id="rId6"/>
+              </a:rPr>
+              <a:t>http://schemas.usgin.org/models/#geosciml-portrayal-faults</a:t>
+            </a:r>
+            <a:r>
+              <a:rPr lang="en-US" dirty="0" smtClean="0"/>
+              <a:t> </a:t>
+            </a:r>
+          </a:p>
+          <a:p>
+            <a:pPr marL="0" indent="0">
+              <a:buNone/>
+            </a:pPr>
+            <a:endParaRPr lang="en-US" dirty="0" smtClean="0"/>
+          </a:p>
+          <a:p>
+            <a:pPr marL="0" indent="0">
+              <a:buNone/>
+            </a:pPr>
+            <a:endParaRPr lang="en-US" dirty="0"/>
           </a:p>
         </p:txBody>
       </p:sp>
     </p:spTree>
     <p:extLst>
       <p:ext uri="{BB962C8B-B14F-4D97-AF65-F5344CB8AC3E}">
-        <p14:creationId xmlns:p14="http://schemas.microsoft.com/office/powerpoint/2010/main" val="457651368"/>
+        <p14:creationId xmlns:p14="http://schemas.microsoft.com/office/powerpoint/2010/main" val="3449606523"/>
       </p:ext>
     </p:extLst>
   </p:cSld>
@@ -3772,14 +3617,10 @@
           <a:p>
             <a:pPr algn="l"/>
             <a:r>
-              <a:rPr lang="en-US" i="1"/>
-              <a:t>Custom Capabilities, </a:t>
-            </a:r>
-            <a:r>
               <a:rPr lang="en-US" i="1" smtClean="0"/>
-              <a:t>WFS</a:t>
-            </a:r>
-            <a:endParaRPr lang="en-US"/>
+              <a:t>Important Bits</a:t>
+            </a:r>
+            <a:endParaRPr lang="en-US" i="1"/>
           </a:p>
         </p:txBody>
       </p:sp>
@@ -3795,112 +3636,74 @@
         </p:nvSpPr>
         <p:spPr/>
         <p:txBody>
-          <a:bodyPr>
-            <a:normAutofit fontScale="85000" lnSpcReduction="20000"/>
-          </a:bodyPr>
-          <a:lstStyle/>
-          <a:p>
-            <a:r>
-              <a:rPr lang="en-US"/>
-              <a:t>Deploy </a:t>
-            </a:r>
-            <a:r>
-              <a:rPr lang="en-US"/>
-              <a:t>your </a:t>
-            </a:r>
-            <a:r>
-              <a:rPr lang="en-US" smtClean="0"/>
-              <a:t>WFS </a:t>
-            </a:r>
-            <a:r>
-              <a:rPr lang="en-US"/>
-              <a:t>service, entering in all metadata</a:t>
-            </a:r>
-          </a:p>
-          <a:p>
-            <a:r>
-              <a:rPr lang="en-US"/>
-              <a:t>Open capabilities documents; </a:t>
-            </a:r>
-            <a:r>
-              <a:rPr lang="en-US" sz="2800">
-                <a:solidFill>
-                  <a:schemeClr val="tx2"/>
-                </a:solidFill>
+          <a:bodyPr/>
+          <a:lstStyle/>
+          <a:p>
+            <a:r>
+              <a:rPr lang="en-US" dirty="0" smtClean="0"/>
+              <a:t>Required Namespace: </a:t>
+            </a:r>
+            <a:r>
+              <a:rPr lang="en-US" sz="2800" dirty="0" smtClean="0">
+                <a:hlinkClick r:id="rId2"/>
               </a:rPr>
-              <a:t>C:\arcgisserver\arcgisoutput\&lt;someservicename&gt;_MapServer</a:t>
-            </a:r>
-          </a:p>
-          <a:p>
-            <a:pPr lvl="1"/>
-            <a:r>
-              <a:rPr lang="en-US"/>
-              <a:t>GetCapabilities100.xml</a:t>
-            </a:r>
-          </a:p>
-          <a:p>
-            <a:pPr lvl="1"/>
-            <a:r>
-              <a:rPr lang="en-US"/>
-              <a:t>GetCapabilities110.xml</a:t>
-            </a:r>
-          </a:p>
-          <a:p>
-            <a:r>
-              <a:rPr lang="en-US"/>
-              <a:t>Add additional </a:t>
-            </a:r>
-            <a:r>
-              <a:rPr lang="en-US"/>
-              <a:t>required </a:t>
-            </a:r>
-            <a:r>
-              <a:rPr lang="en-US" smtClean="0"/>
-              <a:t>metadata</a:t>
-            </a:r>
-          </a:p>
-          <a:p>
-            <a:r>
-              <a:rPr lang="en-US" smtClean="0"/>
-              <a:t>Add prefix-namespace binding (see next slide)</a:t>
-            </a:r>
-            <a:endParaRPr lang="en-US"/>
-          </a:p>
-          <a:p>
-            <a:r>
-              <a:rPr lang="en-US"/>
-              <a:t>Rename documents and place in local file location that is web accessible; </a:t>
-            </a:r>
-            <a:r>
-              <a:rPr lang="en-US">
-                <a:solidFill>
-                  <a:schemeClr val="tx2"/>
-                </a:solidFill>
+              <a:t>http://xmlns.geosciml.org/geosciml-portrayal/2.0</a:t>
+            </a:r>
+            <a:endParaRPr lang="en-US" sz="2800" dirty="0" smtClean="0"/>
+          </a:p>
+          <a:p>
+            <a:r>
+              <a:rPr lang="en-US" dirty="0" smtClean="0"/>
+              <a:t>Recommended Prefix</a:t>
+            </a:r>
+            <a:r>
+              <a:rPr lang="en-US" dirty="0" smtClean="0"/>
+              <a:t>:   </a:t>
+            </a:r>
+            <a:r>
+              <a:rPr lang="en-US" dirty="0" err="1" smtClean="0"/>
+              <a:t>gsmlp</a:t>
+            </a:r>
+            <a:r>
+              <a:rPr lang="en-US" dirty="0" smtClean="0"/>
+              <a:t>   </a:t>
+            </a:r>
+          </a:p>
+          <a:p>
+            <a:r>
+              <a:rPr lang="en-US" dirty="0" smtClean="0"/>
+              <a:t>OBJECTID field – </a:t>
+            </a:r>
+            <a:r>
+              <a:rPr lang="en-US" i="1" dirty="0" smtClean="0"/>
+              <a:t>turn it off in MXD!</a:t>
+            </a:r>
+          </a:p>
+          <a:p>
+            <a:r>
+              <a:rPr lang="en-US" dirty="0" smtClean="0"/>
+              <a:t>Validate your WFS service using the USGIN tool </a:t>
+            </a:r>
+            <a:r>
+              <a:rPr lang="en-US" sz="2800" dirty="0" smtClean="0">
+                <a:hlinkClick r:id="rId3"/>
               </a:rPr>
-              <a:t>C://…(dir)…/inetpub/wwwroot/[ServiceTitle]</a:t>
-            </a:r>
-          </a:p>
-          <a:p>
-            <a:pPr lvl="1"/>
-            <a:r>
-              <a:rPr lang="en-US" smtClean="0"/>
-              <a:t>onegeologyWFS-100.xml</a:t>
-            </a:r>
-          </a:p>
-          <a:p>
-            <a:pPr lvl="1"/>
-            <a:r>
-              <a:rPr lang="en-US"/>
-              <a:t>onegeologyWFS-110.xml</a:t>
-            </a:r>
-            <a:endParaRPr lang="en-US"/>
+              <a:t>http://schemas.usgin.org/validate/wfs</a:t>
+            </a:r>
+            <a:r>
+              <a:rPr lang="en-US" sz="2800" dirty="0" smtClean="0"/>
+              <a:t> </a:t>
+            </a:r>
+          </a:p>
+          <a:p>
+            <a:endParaRPr lang="en-US" dirty="0"/>
           </a:p>
         </p:txBody>
       </p:sp>
     </p:spTree>
     <p:extLst>
       <p:ext uri="{BB962C8B-B14F-4D97-AF65-F5344CB8AC3E}">
-        <p14:creationId xmlns:p14="http://schemas.microsoft.com/office/powerpoint/2010/main" val="197903108"/>
+        <p14:creationId xmlns:p14="http://schemas.microsoft.com/office/powerpoint/2010/main" val="3653546589"/>
       </p:ext>
     </p:extLst>
   </p:cSld>
@@ -3939,126 +3742,155 @@
         </p:nvSpPr>
         <p:spPr/>
         <p:txBody>
+          <a:bodyPr/>
+          <a:lstStyle/>
+          <a:p>
+            <a:pPr algn="l"/>
+            <a:r>
+              <a:rPr lang="en-US" i="1" smtClean="0"/>
+              <a:t>Layer Files and SLDs</a:t>
+            </a:r>
+            <a:endParaRPr lang="en-US" i="1"/>
+          </a:p>
+        </p:txBody>
+      </p:sp>
+      <p:sp>
+        <p:nvSpPr>
+          <p:cNvPr id="3" name="Content Placeholder 2"/>
+          <p:cNvSpPr>
+            <a:spLocks noGrp="1"/>
+          </p:cNvSpPr>
+          <p:nvPr>
+            <p:ph idx="1"/>
+          </p:nvPr>
+        </p:nvSpPr>
+        <p:spPr/>
+        <p:txBody>
           <a:bodyPr>
-            <a:normAutofit fontScale="90000"/>
+            <a:normAutofit fontScale="92500"/>
           </a:bodyPr>
           <a:lstStyle/>
           <a:p>
-            <a:pPr algn="l"/>
-            <a:r>
-              <a:rPr lang="en-US" i="1" smtClean="0"/>
-              <a:t>Prefix-Namespace binding in WFS CC</a:t>
-            </a:r>
-            <a:endParaRPr lang="en-US"/>
-          </a:p>
-        </p:txBody>
-      </p:sp>
-      <p:sp>
-        <p:nvSpPr>
-          <p:cNvPr id="3" name="Content Placeholder 2"/>
-          <p:cNvSpPr>
-            <a:spLocks noGrp="1"/>
-          </p:cNvSpPr>
-          <p:nvPr>
-            <p:ph idx="1"/>
-          </p:nvPr>
-        </p:nvSpPr>
-        <p:spPr/>
-        <p:txBody>
-          <a:bodyPr>
-            <a:normAutofit fontScale="55000" lnSpcReduction="20000"/>
-          </a:bodyPr>
-          <a:lstStyle/>
-          <a:p>
-            <a:pPr marL="0" lvl="1" indent="0">
-              <a:buNone/>
-            </a:pPr>
-            <a:r>
-              <a:rPr lang="en-US" sz="4400"/>
-              <a:t>The GeoSciML-Portrayal namespace must occur as the </a:t>
-            </a:r>
-            <a:r>
-              <a:rPr lang="en-US" sz="4400">
+            <a:pPr marL="0" indent="0">
+              <a:buNone/>
+            </a:pPr>
+            <a:r>
+              <a:rPr lang="en-US"/>
+              <a:t>A</a:t>
+            </a:r>
+            <a:r>
+              <a:rPr lang="en-US" smtClean="0"/>
+              <a:t>vailable at  </a:t>
+            </a:r>
+          </a:p>
+          <a:p>
+            <a:pPr marL="0" indent="0">
+              <a:buNone/>
+            </a:pPr>
+            <a:r>
+              <a:rPr lang="en-US" sz="2700" smtClean="0">
+                <a:hlinkClick r:id="rId2"/>
+              </a:rPr>
+              <a:t>https://github.com/usgin-models/GeoSciML-Portrayal/archive/master.zip</a:t>
+            </a:r>
+            <a:r>
+              <a:rPr lang="en-US" sz="2700" smtClean="0"/>
+              <a:t> </a:t>
+            </a:r>
+          </a:p>
+          <a:p>
+            <a:pPr marL="0" indent="0">
+              <a:buNone/>
+            </a:pPr>
+            <a:r>
+              <a:rPr lang="en-US" sz="2700" smtClean="0"/>
+              <a:t>Layer files: usginOneGeology/LayerFiles </a:t>
+            </a:r>
+            <a:r>
+              <a:rPr lang="en-US" sz="2700" i="1" smtClean="0">
                 <a:solidFill>
-                  <a:srgbClr val="FF0000"/>
+                  <a:schemeClr val="accent2"/>
                 </a:solidFill>
               </a:rPr>
-              <a:t>schemaLocation</a:t>
-            </a:r>
-            <a:r>
-              <a:rPr lang="en-US" sz="4400"/>
-              <a:t> and the </a:t>
-            </a:r>
-            <a:r>
-              <a:rPr lang="en-US" sz="4400">
+              <a:t>– can be used globally</a:t>
+            </a:r>
+          </a:p>
+          <a:p>
+            <a:pPr marL="0" indent="0">
+              <a:buNone/>
+            </a:pPr>
+            <a:r>
+              <a:rPr lang="en-US" sz="2700" smtClean="0"/>
+              <a:t>SLD Examples: usginOneGeology/SLD_Examples</a:t>
+            </a:r>
+          </a:p>
+          <a:p>
+            <a:pPr lvl="1"/>
+            <a:r>
+              <a:rPr lang="en-US" sz="2300" smtClean="0"/>
+              <a:t>WMS SLDs tailored for each layer (name)</a:t>
+            </a:r>
+          </a:p>
+          <a:p>
+            <a:pPr lvl="1"/>
+            <a:r>
+              <a:rPr lang="en-US" sz="2300" smtClean="0"/>
+              <a:t>WFS SLDs </a:t>
+            </a:r>
+            <a:r>
+              <a:rPr lang="en-US" sz="2300" i="1" smtClean="0">
                 <a:solidFill>
-                  <a:srgbClr val="0070C0"/>
+                  <a:schemeClr val="accent2"/>
                 </a:solidFill>
               </a:rPr>
-              <a:t>prefix must be bound to that namespace</a:t>
-            </a:r>
-            <a:r>
-              <a:rPr lang="en-US" sz="4400"/>
-              <a:t> in the first text grouping of the document:</a:t>
+              <a:t>can be used globally</a:t>
+            </a:r>
+            <a:r>
+              <a:rPr lang="en-US" sz="2300" smtClean="0"/>
+              <a:t> (symbology based on representativeAge_uri )</a:t>
+            </a:r>
+            <a:endParaRPr lang="en-US" sz="2300"/>
+          </a:p>
+          <a:p>
+            <a:pPr lvl="1"/>
+            <a:r>
+              <a:rPr lang="en-US" sz="2300" smtClean="0"/>
+              <a:t>SLDs can be made in ArcMap using the Arc2Earth plug-in</a:t>
+            </a:r>
+          </a:p>
+          <a:p>
+            <a:pPr marL="457200" lvl="1" indent="0">
+              <a:buNone/>
+            </a:pPr>
+            <a:r>
+              <a:rPr lang="en-US" sz="2300" smtClean="0">
+                <a:hlinkClick r:id="rId3"/>
+              </a:rPr>
+              <a:t>http://lab.usgin.org/groups/troubleshooting-web-service-deployment-blog/how-create-styled-layer-descriptor-sld-using-arc2</a:t>
+            </a:r>
+            <a:r>
+              <a:rPr lang="en-US" sz="2300" smtClean="0"/>
+              <a:t> </a:t>
             </a:r>
           </a:p>
           <a:p>
             <a:pPr marL="0" indent="0">
               <a:buNone/>
             </a:pPr>
-            <a:r>
-              <a:rPr lang="en-US"/>
-              <a:t> </a:t>
-            </a:r>
+            <a:endParaRPr lang="en-US" sz="2700"/>
           </a:p>
           <a:p>
             <a:pPr marL="0" indent="0">
               <a:buNone/>
             </a:pPr>
-            <a:r>
-              <a:rPr lang="en-US"/>
-              <a:t>&lt;wfs:WFS_Capabilities version='1.1.0' xsi:schemaLocation='</a:t>
-            </a:r>
-            <a:r>
-              <a:rPr lang="en-US">
-                <a:solidFill>
-                  <a:srgbClr val="FF0000"/>
-                </a:solidFill>
-              </a:rPr>
-              <a:t>http://xmlns.geosciml.org/geosciml-portrayal/2.0 </a:t>
-            </a:r>
-            <a:r>
-              <a:rPr lang="en-US"/>
-              <a:t>http://www.opengis.net/gml http://schemas.opengis.net/gml/3.1.1/base/gml.xsd http://www.opengis.net/ogc http://schemas.opengis.net/filter/1.1.0/filter.xsd http://www.opengis.net/ows http://schemas.opengis.net/ows/1.0.0/owsAll.xsd http://www.opengis.net/wfs http://schemas.opengis.net/wfs/1.1.0/wfs.xsd' xmlns:wfs='http://www.opengis.net/wfs' xmlns:ogc='http://www.opengis.net/ogc' xmlns:gml='http://www.opengis.net/gml' xmlns:ows='http://www.opengis.net/ows' xmlns:xsi='http://www.w3.org/2001/XMLSchema-instance' xmlns:xlink='http://www.w3.org/1999/xlink' </a:t>
-            </a:r>
-            <a:r>
-              <a:rPr lang="en-US">
-                <a:solidFill>
-                  <a:srgbClr val="0070C0"/>
-                </a:solidFill>
-              </a:rPr>
-              <a:t>xmlns:gsmlp='http://</a:t>
-            </a:r>
-            <a:r>
-              <a:rPr lang="en-US">
-                <a:solidFill>
-                  <a:srgbClr val="0070C0"/>
-                </a:solidFill>
-              </a:rPr>
-              <a:t>xmlns.geosciml.org/geosciml-portrayal/2.0</a:t>
-            </a:r>
-            <a:r>
-              <a:rPr lang="en-US" smtClean="0"/>
-              <a:t>'&gt;</a:t>
-            </a:r>
-            <a:endParaRPr lang="en-US" sz="4000"/>
+            <a:endParaRPr lang="en-US" sz="2700"/>
           </a:p>
         </p:txBody>
       </p:sp>
     </p:spTree>
     <p:extLst>
       <p:ext uri="{BB962C8B-B14F-4D97-AF65-F5344CB8AC3E}">
-        <p14:creationId xmlns:p14="http://schemas.microsoft.com/office/powerpoint/2010/main" val="3481341416"/>
+        <p14:creationId xmlns:p14="http://schemas.microsoft.com/office/powerpoint/2010/main" val="1003467880"/>
       </p:ext>
     </p:extLst>
   </p:cSld>
@@ -4097,17 +3929,262 @@
         </p:nvSpPr>
         <p:spPr/>
         <p:txBody>
+          <a:bodyPr>
+            <a:normAutofit fontScale="90000"/>
+          </a:bodyPr>
+          <a:lstStyle/>
+          <a:p>
+            <a:pPr algn="l"/>
+            <a:r>
+              <a:rPr lang="en-US" i="1" smtClean="0"/>
+              <a:t>Layer-Level Metadata Requirements</a:t>
+            </a:r>
+            <a:endParaRPr lang="en-US"/>
+          </a:p>
+        </p:txBody>
+      </p:sp>
+      <p:sp>
+        <p:nvSpPr>
+          <p:cNvPr id="3" name="Content Placeholder 2"/>
+          <p:cNvSpPr>
+            <a:spLocks noGrp="1"/>
+          </p:cNvSpPr>
+          <p:nvPr>
+            <p:ph idx="1"/>
+          </p:nvPr>
+        </p:nvSpPr>
+        <p:spPr/>
+        <p:txBody>
+          <a:bodyPr>
+            <a:normAutofit fontScale="85000" lnSpcReduction="20000"/>
+          </a:bodyPr>
+          <a:lstStyle/>
+          <a:p>
+            <a:r>
+              <a:rPr lang="en-US" dirty="0" smtClean="0"/>
+              <a:t>Abstract</a:t>
+            </a:r>
+          </a:p>
+          <a:p>
+            <a:r>
+              <a:rPr lang="en-US" dirty="0" smtClean="0"/>
+              <a:t>Keywords</a:t>
+            </a:r>
+          </a:p>
+          <a:p>
+            <a:pPr lvl="1"/>
+            <a:r>
+              <a:rPr lang="en-US" dirty="0" err="1"/>
+              <a:t>continent@North</a:t>
+            </a:r>
+            <a:r>
+              <a:rPr lang="en-US" dirty="0"/>
+              <a:t> </a:t>
+            </a:r>
+            <a:r>
+              <a:rPr lang="en-US" dirty="0" smtClean="0"/>
+              <a:t>America</a:t>
+            </a:r>
+          </a:p>
+          <a:p>
+            <a:pPr lvl="1"/>
+            <a:r>
+              <a:rPr lang="en-US" dirty="0" err="1" smtClean="0"/>
+              <a:t>geographicarea@Arizona</a:t>
+            </a:r>
+            <a:endParaRPr lang="en-US" dirty="0" smtClean="0"/>
+          </a:p>
+          <a:p>
+            <a:pPr lvl="1"/>
+            <a:r>
+              <a:rPr lang="en-US" dirty="0" err="1" smtClean="0"/>
+              <a:t>dataprovider@AZGS</a:t>
+            </a:r>
+            <a:endParaRPr lang="en-US" dirty="0" smtClean="0"/>
+          </a:p>
+          <a:p>
+            <a:pPr lvl="1"/>
+            <a:r>
+              <a:rPr lang="en-US" dirty="0" err="1" smtClean="0"/>
+              <a:t>serviceprovider@AZGS</a:t>
+            </a:r>
+            <a:endParaRPr lang="en-US" dirty="0" smtClean="0"/>
+          </a:p>
+          <a:p>
+            <a:pPr lvl="1"/>
+            <a:r>
+              <a:rPr lang="en-US" dirty="0" smtClean="0"/>
+              <a:t>3-star WMS: </a:t>
+            </a:r>
+            <a:r>
+              <a:rPr lang="en-US" dirty="0" err="1" smtClean="0"/>
+              <a:t>Geosciml_portrayal_age_or_litho_queryable</a:t>
+            </a:r>
+            <a:endParaRPr lang="en-US" dirty="0"/>
+          </a:p>
+          <a:p>
+            <a:r>
+              <a:rPr lang="en-US" dirty="0" smtClean="0"/>
+              <a:t>Bounding </a:t>
+            </a:r>
+            <a:r>
+              <a:rPr lang="en-US" dirty="0" smtClean="0"/>
+              <a:t>Boxes</a:t>
+            </a:r>
+          </a:p>
+          <a:p>
+            <a:r>
+              <a:rPr lang="en-US" dirty="0" smtClean="0"/>
+              <a:t>SRS</a:t>
+            </a:r>
+          </a:p>
+          <a:p>
+            <a:r>
+              <a:rPr lang="en-US" dirty="0" err="1" smtClean="0"/>
+              <a:t>MetadataURL</a:t>
+            </a:r>
+            <a:endParaRPr lang="en-US" dirty="0" smtClean="0"/>
+          </a:p>
+          <a:p>
+            <a:r>
+              <a:rPr lang="en-US" dirty="0" err="1" smtClean="0"/>
+              <a:t>ReadableLengendGraphicURL</a:t>
+            </a:r>
+            <a:endParaRPr lang="en-US" dirty="0" smtClean="0"/>
+          </a:p>
+          <a:p>
+            <a:pPr marL="0" indent="0">
+              <a:buNone/>
+            </a:pPr>
+            <a:endParaRPr lang="en-US" dirty="0"/>
+          </a:p>
+          <a:p>
+            <a:pPr marL="0" indent="0">
+              <a:buNone/>
+            </a:pPr>
+            <a:endParaRPr lang="en-US" b="1" i="1" dirty="0"/>
+          </a:p>
+        </p:txBody>
+      </p:sp>
+      <p:sp>
+        <p:nvSpPr>
+          <p:cNvPr id="4" name="TextBox 3"/>
+          <p:cNvSpPr txBox="1"/>
+          <p:nvPr/>
+        </p:nvSpPr>
+        <p:spPr>
+          <a:xfrm>
+            <a:off x="1752600" y="6019800"/>
+            <a:ext cx="7162800" cy="892552"/>
+          </a:xfrm>
+          <a:prstGeom prst="rect">
+            <a:avLst/>
+          </a:prstGeom>
+          <a:noFill/>
+        </p:spPr>
+        <p:txBody>
+          <a:bodyPr wrap="square" rtlCol="0">
+            <a:spAutoFit/>
+          </a:bodyPr>
+          <a:lstStyle/>
+          <a:p>
+            <a:r>
+              <a:rPr lang="en-US" sz="2600" b="1" i="1" smtClean="0"/>
+              <a:t>Will need to make Custom Capabilities files to accommodate the metadata requirements!</a:t>
+            </a:r>
+            <a:endParaRPr lang="en-US" sz="2600" b="1" i="1"/>
+          </a:p>
+        </p:txBody>
+      </p:sp>
+      <p:sp>
+        <p:nvSpPr>
+          <p:cNvPr id="5" name="Right Arrow 4"/>
+          <p:cNvSpPr/>
+          <p:nvPr/>
+        </p:nvSpPr>
+        <p:spPr>
+          <a:xfrm>
+            <a:off x="304800" y="6172200"/>
+            <a:ext cx="1295400" cy="457200"/>
+          </a:xfrm>
+          <a:prstGeom prst="rightArrow">
+            <a:avLst/>
+          </a:prstGeom>
+        </p:spPr>
+        <p:style>
+          <a:lnRef idx="2">
+            <a:schemeClr val="accent1">
+              <a:shade val="50000"/>
+            </a:schemeClr>
+          </a:lnRef>
+          <a:fillRef idx="1">
+            <a:schemeClr val="accent1"/>
+          </a:fillRef>
+          <a:effectRef idx="0">
+            <a:schemeClr val="accent1"/>
+          </a:effectRef>
+          <a:fontRef idx="minor">
+            <a:schemeClr val="lt1"/>
+          </a:fontRef>
+        </p:style>
+        <p:txBody>
+          <a:bodyPr rtlCol="0" anchor="ctr"/>
+          <a:lstStyle/>
+          <a:p>
+            <a:pPr algn="ctr"/>
+            <a:endParaRPr lang="en-US"/>
+          </a:p>
+        </p:txBody>
+      </p:sp>
+    </p:spTree>
+    <p:extLst>
+      <p:ext uri="{BB962C8B-B14F-4D97-AF65-F5344CB8AC3E}">
+        <p14:creationId xmlns:p14="http://schemas.microsoft.com/office/powerpoint/2010/main" val="400006958"/>
+      </p:ext>
+    </p:extLst>
+  </p:cSld>
+  <p:clrMapOvr>
+    <a:masterClrMapping/>
+  </p:clrMapOvr>
+</p:sld>
+</file>
+
+<file path=ppt/slides/slide15.xml><?xml version="1.0" encoding="utf-8"?>
+<p:sld xmlns:a="http://schemas.openxmlformats.org/drawingml/2006/main" xmlns:r="http://schemas.openxmlformats.org/officeDocument/2006/relationships" xmlns:p="http://schemas.openxmlformats.org/presentationml/2006/main">
+  <p:cSld>
+    <p:spTree>
+      <p:nvGrpSpPr>
+        <p:cNvPr id="1" name=""/>
+        <p:cNvGrpSpPr/>
+        <p:nvPr/>
+      </p:nvGrpSpPr>
+      <p:grpSpPr>
+        <a:xfrm>
+          <a:off x="0" y="0"/>
+          <a:ext cx="0" cy="0"/>
+          <a:chOff x="0" y="0"/>
+          <a:chExt cx="0" cy="0"/>
+        </a:xfrm>
+      </p:grpSpPr>
+      <p:sp>
+        <p:nvSpPr>
+          <p:cNvPr id="2" name="Title 1"/>
+          <p:cNvSpPr>
+            <a:spLocks noGrp="1"/>
+          </p:cNvSpPr>
+          <p:nvPr>
+            <p:ph type="title"/>
+          </p:nvPr>
+        </p:nvSpPr>
+        <p:spPr/>
+        <p:txBody>
           <a:bodyPr/>
           <a:lstStyle/>
           <a:p>
             <a:pPr algn="l"/>
             <a:r>
               <a:rPr lang="en-US" i="1" smtClean="0"/>
-              <a:t>Enable Custom </a:t>
-            </a:r>
-            <a:r>
-              <a:rPr lang="en-US" i="1"/>
-              <a:t>Capabilities</a:t>
+              <a:t>Custom Capabilities, WMS</a:t>
             </a:r>
             <a:endParaRPr lang="en-US"/>
           </a:p>
@@ -4126,105 +4203,224 @@
         <p:spPr/>
         <p:txBody>
           <a:bodyPr>
-            <a:normAutofit/>
+            <a:normAutofit fontScale="85000" lnSpcReduction="10000"/>
           </a:bodyPr>
           <a:lstStyle/>
           <a:p>
-            <a:pPr lvl="0"/>
-            <a:r>
-              <a:rPr lang="en-US" sz="2800"/>
-              <a:t>Stop the service in ArcServer or </a:t>
-            </a:r>
-            <a:r>
-              <a:rPr lang="en-US" sz="2800"/>
-              <a:t>ArcServer </a:t>
-            </a:r>
-            <a:r>
-              <a:rPr lang="en-US" sz="2800" smtClean="0"/>
-              <a:t>Manager</a:t>
-            </a:r>
-            <a:endParaRPr lang="en-US" sz="2800"/>
-          </a:p>
-          <a:p>
-            <a:pPr lvl="0"/>
-            <a:r>
-              <a:rPr lang="en-US" sz="2800" smtClean="0"/>
-              <a:t>Right-click </a:t>
-            </a:r>
-            <a:r>
-              <a:rPr lang="en-US" sz="2800"/>
-              <a:t>on the service and </a:t>
-            </a:r>
-            <a:r>
-              <a:rPr lang="en-US" sz="2800"/>
-              <a:t>select </a:t>
-            </a:r>
-            <a:endParaRPr lang="en-US" sz="2800"/>
-          </a:p>
-          <a:p>
-            <a:pPr marL="0" lvl="0" indent="0">
-              <a:buNone/>
-            </a:pPr>
-            <a:r>
-              <a:rPr lang="en-US" sz="2800" i="1" smtClean="0"/>
-              <a:t>Service Properties </a:t>
-            </a:r>
-            <a:endParaRPr lang="en-US" sz="2800" i="1"/>
-          </a:p>
-          <a:p>
-            <a:pPr lvl="0"/>
-            <a:r>
-              <a:rPr lang="en-US" sz="2800"/>
-              <a:t>Navigate to the </a:t>
-            </a:r>
-            <a:r>
-              <a:rPr lang="en-US" sz="2800" i="1"/>
-              <a:t>Capabilities</a:t>
-            </a:r>
-            <a:r>
-              <a:rPr lang="en-US" sz="2800"/>
-              <a:t> tab and </a:t>
-            </a:r>
-            <a:r>
-              <a:rPr lang="en-US" sz="2800"/>
-              <a:t>select </a:t>
-            </a:r>
-            <a:r>
-              <a:rPr lang="en-US" sz="2800" i="1" smtClean="0"/>
-              <a:t>WMS</a:t>
-            </a:r>
-            <a:r>
-              <a:rPr lang="en-US" sz="2800" smtClean="0"/>
-              <a:t> </a:t>
-            </a:r>
-            <a:endParaRPr lang="en-US" sz="2800"/>
-          </a:p>
-          <a:p>
-            <a:pPr lvl="0"/>
-            <a:r>
-              <a:rPr lang="en-US" sz="2800"/>
-              <a:t>Select </a:t>
-            </a:r>
-            <a:r>
-              <a:rPr lang="en-US" sz="2800" i="1"/>
-              <a:t>Use External Capabilities files</a:t>
-            </a:r>
-            <a:r>
-              <a:rPr lang="en-US" sz="2800"/>
-              <a:t>. Specify the location and prefix, for example:</a:t>
-            </a:r>
-          </a:p>
-          <a:p>
-            <a:pPr marL="0" indent="0">
-              <a:buNone/>
-            </a:pPr>
+            <a:r>
+              <a:rPr lang="en-US"/>
+              <a:t>Deploy your WMS service, entering in all </a:t>
+            </a:r>
+            <a:r>
+              <a:rPr lang="en-US" smtClean="0"/>
+              <a:t>metadata</a:t>
+            </a:r>
+          </a:p>
+          <a:p>
+            <a:r>
+              <a:rPr lang="en-US" smtClean="0"/>
+              <a:t>Open capabilities documents; </a:t>
+            </a:r>
+            <a:r>
+              <a:rPr lang="en-US" sz="2800" smtClean="0">
+                <a:solidFill>
+                  <a:schemeClr val="tx2"/>
+                </a:solidFill>
+              </a:rPr>
+              <a:t>C</a:t>
+            </a:r>
             <a:r>
               <a:rPr lang="en-US" sz="2800">
                 <a:solidFill>
                   <a:schemeClr val="tx2"/>
                 </a:solidFill>
               </a:rPr>
-              <a:t>http</a:t>
+              <a:t>:\arcgisserver\arcgisoutput\&lt;someservicename&gt;_</a:t>
+            </a:r>
+            <a:r>
+              <a:rPr lang="en-US" sz="2800" smtClean="0">
+                <a:solidFill>
+                  <a:schemeClr val="tx2"/>
+                </a:solidFill>
+              </a:rPr>
+              <a:t>MapServer</a:t>
+            </a:r>
+          </a:p>
+          <a:p>
+            <a:pPr lvl="1"/>
+            <a:r>
+              <a:rPr lang="en-US"/>
+              <a:t>GetCapabilities100.xml</a:t>
+            </a:r>
+          </a:p>
+          <a:p>
+            <a:pPr lvl="1"/>
+            <a:r>
+              <a:rPr lang="en-US"/>
+              <a:t>GetCapabilities110.xml</a:t>
+            </a:r>
+          </a:p>
+          <a:p>
+            <a:r>
+              <a:rPr lang="en-US"/>
+              <a:t>Add </a:t>
+            </a:r>
+            <a:r>
+              <a:rPr lang="en-US" smtClean="0"/>
+              <a:t>additional required metadata</a:t>
+            </a:r>
+          </a:p>
+          <a:p>
+            <a:r>
+              <a:rPr lang="en-US" smtClean="0"/>
+              <a:t>Rename documents and place in </a:t>
+            </a:r>
+            <a:r>
+              <a:rPr lang="en-US"/>
+              <a:t>local file location that is web </a:t>
+            </a:r>
+            <a:r>
+              <a:rPr lang="en-US" smtClean="0"/>
+              <a:t>accessible; </a:t>
+            </a:r>
+            <a:r>
+              <a:rPr lang="en-US">
+                <a:solidFill>
+                  <a:schemeClr val="tx2"/>
+                </a:solidFill>
+              </a:rPr>
+              <a:t>C://…(dir)…/inetpub/wwwroot/[ServiceTitle</a:t>
+            </a:r>
+            <a:r>
+              <a:rPr lang="en-US" smtClean="0">
+                <a:solidFill>
+                  <a:schemeClr val="tx2"/>
+                </a:solidFill>
+              </a:rPr>
+              <a:t>]</a:t>
+            </a:r>
+          </a:p>
+          <a:p>
+            <a:pPr lvl="1"/>
+            <a:r>
+              <a:rPr lang="en-US" smtClean="0"/>
+              <a:t>onegeologyWMS-111.xml</a:t>
+            </a:r>
+          </a:p>
+          <a:p>
+            <a:pPr lvl="1"/>
+            <a:r>
+              <a:rPr lang="en-US"/>
+              <a:t>onegeologyWMS-130.xml</a:t>
+            </a:r>
+          </a:p>
+          <a:p>
+            <a:pPr lvl="1"/>
+            <a:endParaRPr lang="en-US"/>
+          </a:p>
+          <a:p>
+            <a:pPr marL="0" indent="0">
+              <a:buNone/>
+            </a:pPr>
+            <a:endParaRPr lang="en-US"/>
+          </a:p>
+          <a:p>
+            <a:endParaRPr lang="en-US"/>
+          </a:p>
+        </p:txBody>
+      </p:sp>
+    </p:spTree>
+    <p:extLst>
+      <p:ext uri="{BB962C8B-B14F-4D97-AF65-F5344CB8AC3E}">
+        <p14:creationId xmlns:p14="http://schemas.microsoft.com/office/powerpoint/2010/main" val="457651368"/>
+      </p:ext>
+    </p:extLst>
+  </p:cSld>
+  <p:clrMapOvr>
+    <a:masterClrMapping/>
+  </p:clrMapOvr>
+</p:sld>
+</file>
+
+<file path=ppt/slides/slide16.xml><?xml version="1.0" encoding="utf-8"?>
+<p:sld xmlns:a="http://schemas.openxmlformats.org/drawingml/2006/main" xmlns:r="http://schemas.openxmlformats.org/officeDocument/2006/relationships" xmlns:p="http://schemas.openxmlformats.org/presentationml/2006/main">
+  <p:cSld>
+    <p:spTree>
+      <p:nvGrpSpPr>
+        <p:cNvPr id="1" name=""/>
+        <p:cNvGrpSpPr/>
+        <p:nvPr/>
+      </p:nvGrpSpPr>
+      <p:grpSpPr>
+        <a:xfrm>
+          <a:off x="0" y="0"/>
+          <a:ext cx="0" cy="0"/>
+          <a:chOff x="0" y="0"/>
+          <a:chExt cx="0" cy="0"/>
+        </a:xfrm>
+      </p:grpSpPr>
+      <p:sp>
+        <p:nvSpPr>
+          <p:cNvPr id="2" name="Title 1"/>
+          <p:cNvSpPr>
+            <a:spLocks noGrp="1"/>
+          </p:cNvSpPr>
+          <p:nvPr>
+            <p:ph type="title"/>
+          </p:nvPr>
+        </p:nvSpPr>
+        <p:spPr/>
+        <p:txBody>
+          <a:bodyPr/>
+          <a:lstStyle/>
+          <a:p>
+            <a:pPr algn="l"/>
+            <a:r>
+              <a:rPr lang="en-US" i="1"/>
+              <a:t>Custom Capabilities, </a:t>
+            </a:r>
+            <a:r>
+              <a:rPr lang="en-US" i="1" smtClean="0"/>
+              <a:t>WFS</a:t>
+            </a:r>
+            <a:endParaRPr lang="en-US"/>
+          </a:p>
+        </p:txBody>
+      </p:sp>
+      <p:sp>
+        <p:nvSpPr>
+          <p:cNvPr id="3" name="Content Placeholder 2"/>
+          <p:cNvSpPr>
+            <a:spLocks noGrp="1"/>
+          </p:cNvSpPr>
+          <p:nvPr>
+            <p:ph idx="1"/>
+          </p:nvPr>
+        </p:nvSpPr>
+        <p:spPr/>
+        <p:txBody>
+          <a:bodyPr>
+            <a:normAutofit fontScale="85000" lnSpcReduction="20000"/>
+          </a:bodyPr>
+          <a:lstStyle/>
+          <a:p>
+            <a:r>
+              <a:rPr lang="en-US"/>
+              <a:t>Deploy your </a:t>
+            </a:r>
+            <a:r>
+              <a:rPr lang="en-US" smtClean="0"/>
+              <a:t>WFS </a:t>
+            </a:r>
+            <a:r>
+              <a:rPr lang="en-US"/>
+              <a:t>service, entering in all metadata</a:t>
+            </a:r>
+          </a:p>
+          <a:p>
+            <a:r>
+              <a:rPr lang="en-US"/>
+              <a:t>Open capabilities documents; </a:t>
             </a:r>
             <a:r>
               <a:rPr lang="en-US" sz="2800">
@@ -4232,7 +4428,619 @@
                   <a:schemeClr val="tx2"/>
                 </a:solidFill>
               </a:rPr>
-              <a:t>://</a:t>
+              <a:t>C:\arcgisserver\arcgisoutput\&lt;someservicename&gt;_MapServer</a:t>
+            </a:r>
+          </a:p>
+          <a:p>
+            <a:pPr lvl="1"/>
+            <a:r>
+              <a:rPr lang="en-US"/>
+              <a:t>GetCapabilities100.xml</a:t>
+            </a:r>
+          </a:p>
+          <a:p>
+            <a:pPr lvl="1"/>
+            <a:r>
+              <a:rPr lang="en-US"/>
+              <a:t>GetCapabilities110.xml</a:t>
+            </a:r>
+          </a:p>
+          <a:p>
+            <a:r>
+              <a:rPr lang="en-US"/>
+              <a:t>Add additional required </a:t>
+            </a:r>
+            <a:r>
+              <a:rPr lang="en-US" smtClean="0"/>
+              <a:t>metadata</a:t>
+            </a:r>
+          </a:p>
+          <a:p>
+            <a:r>
+              <a:rPr lang="en-US" smtClean="0"/>
+              <a:t>Add prefix-namespace binding (see next slide)</a:t>
+            </a:r>
+            <a:endParaRPr lang="en-US"/>
+          </a:p>
+          <a:p>
+            <a:r>
+              <a:rPr lang="en-US"/>
+              <a:t>Rename documents and place in local file location that is web accessible; </a:t>
+            </a:r>
+            <a:r>
+              <a:rPr lang="en-US">
+                <a:solidFill>
+                  <a:schemeClr val="tx2"/>
+                </a:solidFill>
+              </a:rPr>
+              <a:t>C://…(dir)…/inetpub/wwwroot/[ServiceTitle]</a:t>
+            </a:r>
+          </a:p>
+          <a:p>
+            <a:pPr lvl="1"/>
+            <a:r>
+              <a:rPr lang="en-US" smtClean="0"/>
+              <a:t>onegeologyWFS-100.xml</a:t>
+            </a:r>
+          </a:p>
+          <a:p>
+            <a:pPr lvl="1"/>
+            <a:r>
+              <a:rPr lang="en-US"/>
+              <a:t>onegeologyWFS-110.xml</a:t>
+            </a:r>
+          </a:p>
+        </p:txBody>
+      </p:sp>
+    </p:spTree>
+    <p:extLst>
+      <p:ext uri="{BB962C8B-B14F-4D97-AF65-F5344CB8AC3E}">
+        <p14:creationId xmlns:p14="http://schemas.microsoft.com/office/powerpoint/2010/main" val="197903108"/>
+      </p:ext>
+    </p:extLst>
+  </p:cSld>
+  <p:clrMapOvr>
+    <a:masterClrMapping/>
+  </p:clrMapOvr>
+</p:sld>
+</file>
+
+<file path=ppt/slides/slide17.xml><?xml version="1.0" encoding="utf-8"?>
+<p:sld xmlns:a="http://schemas.openxmlformats.org/drawingml/2006/main" xmlns:r="http://schemas.openxmlformats.org/officeDocument/2006/relationships" xmlns:p="http://schemas.openxmlformats.org/presentationml/2006/main">
+  <p:cSld>
+    <p:spTree>
+      <p:nvGrpSpPr>
+        <p:cNvPr id="1" name=""/>
+        <p:cNvGrpSpPr/>
+        <p:nvPr/>
+      </p:nvGrpSpPr>
+      <p:grpSpPr>
+        <a:xfrm>
+          <a:off x="0" y="0"/>
+          <a:ext cx="0" cy="0"/>
+          <a:chOff x="0" y="0"/>
+          <a:chExt cx="0" cy="0"/>
+        </a:xfrm>
+      </p:grpSpPr>
+      <p:sp>
+        <p:nvSpPr>
+          <p:cNvPr id="2" name="Title 1"/>
+          <p:cNvSpPr>
+            <a:spLocks noGrp="1"/>
+          </p:cNvSpPr>
+          <p:nvPr>
+            <p:ph type="title"/>
+          </p:nvPr>
+        </p:nvSpPr>
+        <p:spPr/>
+        <p:txBody>
+          <a:bodyPr>
+            <a:normAutofit fontScale="90000"/>
+          </a:bodyPr>
+          <a:lstStyle/>
+          <a:p>
+            <a:pPr algn="l"/>
+            <a:r>
+              <a:rPr lang="en-US" i="1" smtClean="0"/>
+              <a:t>Prefix-Namespace binding in WFS CC</a:t>
+            </a:r>
+            <a:endParaRPr lang="en-US"/>
+          </a:p>
+        </p:txBody>
+      </p:sp>
+      <p:sp>
+        <p:nvSpPr>
+          <p:cNvPr id="3" name="Content Placeholder 2"/>
+          <p:cNvSpPr>
+            <a:spLocks noGrp="1"/>
+          </p:cNvSpPr>
+          <p:nvPr>
+            <p:ph idx="1"/>
+          </p:nvPr>
+        </p:nvSpPr>
+        <p:spPr>
+          <a:xfrm>
+            <a:off x="457200" y="1219200"/>
+            <a:ext cx="8229600" cy="4800600"/>
+          </a:xfrm>
+        </p:spPr>
+        <p:txBody>
+          <a:bodyPr>
+            <a:normAutofit fontScale="25000" lnSpcReduction="20000"/>
+          </a:bodyPr>
+          <a:lstStyle/>
+          <a:p>
+            <a:pPr marL="0" lvl="1" indent="0">
+              <a:lnSpc>
+                <a:spcPct val="120000"/>
+              </a:lnSpc>
+              <a:buNone/>
+            </a:pPr>
+            <a:r>
+              <a:rPr lang="en-US" sz="7200" dirty="0"/>
+              <a:t>The GeoSciML-Portrayal namespace must occur as the </a:t>
+            </a:r>
+            <a:r>
+              <a:rPr lang="en-US" sz="7200" dirty="0" err="1">
+                <a:solidFill>
+                  <a:srgbClr val="FF0000"/>
+                </a:solidFill>
+              </a:rPr>
+              <a:t>schemaLocation</a:t>
+            </a:r>
+            <a:r>
+              <a:rPr lang="en-US" sz="7200" dirty="0"/>
+              <a:t> and the </a:t>
+            </a:r>
+            <a:r>
+              <a:rPr lang="en-US" sz="7200" dirty="0">
+                <a:solidFill>
+                  <a:srgbClr val="0070C0"/>
+                </a:solidFill>
+              </a:rPr>
+              <a:t>prefix must be bound to that namespace</a:t>
+            </a:r>
+            <a:r>
+              <a:rPr lang="en-US" sz="7200" dirty="0"/>
+              <a:t> in the first text grouping of the document:</a:t>
+            </a:r>
+          </a:p>
+          <a:p>
+            <a:pPr marL="0" indent="0">
+              <a:buNone/>
+            </a:pPr>
+            <a:r>
+              <a:rPr lang="en-US" dirty="0"/>
+              <a:t> </a:t>
+            </a:r>
+          </a:p>
+          <a:p>
+            <a:pPr marL="0" indent="0">
+              <a:lnSpc>
+                <a:spcPct val="143000"/>
+              </a:lnSpc>
+              <a:buNone/>
+            </a:pPr>
+            <a:r>
+              <a:rPr lang="en-US" sz="6400" dirty="0"/>
+              <a:t>&lt;</a:t>
+            </a:r>
+            <a:r>
+              <a:rPr lang="en-US" sz="6400" dirty="0" err="1"/>
+              <a:t>wfs:WFS_Capabilities</a:t>
+            </a:r>
+            <a:r>
+              <a:rPr lang="en-US" sz="6400" dirty="0"/>
+              <a:t> version='1.1.0' </a:t>
+            </a:r>
+            <a:endParaRPr lang="en-US" sz="6400" dirty="0" smtClean="0"/>
+          </a:p>
+          <a:p>
+            <a:pPr marL="0" indent="0">
+              <a:lnSpc>
+                <a:spcPct val="143000"/>
+              </a:lnSpc>
+              <a:buNone/>
+            </a:pPr>
+            <a:r>
+              <a:rPr lang="en-US" sz="6400" dirty="0" err="1" smtClean="0"/>
+              <a:t>xsi:schemaLocation</a:t>
+            </a:r>
+            <a:r>
+              <a:rPr lang="en-US" sz="6400" dirty="0"/>
+              <a:t>=</a:t>
+            </a:r>
+            <a:r>
+              <a:rPr lang="en-US" sz="8000" b="1" dirty="0"/>
+              <a:t>'</a:t>
+            </a:r>
+            <a:r>
+              <a:rPr lang="en-US" sz="8000" b="1" dirty="0">
+                <a:solidFill>
+                  <a:srgbClr val="FF0000"/>
+                </a:solidFill>
+              </a:rPr>
+              <a:t>http://xmlns.geosciml.org/</a:t>
+            </a:r>
+            <a:r>
+              <a:rPr lang="en-US" sz="8000" b="1" dirty="0" err="1">
+                <a:solidFill>
+                  <a:srgbClr val="FF0000"/>
+                </a:solidFill>
+              </a:rPr>
+              <a:t>geosciml</a:t>
+            </a:r>
+            <a:r>
+              <a:rPr lang="en-US" sz="8000" b="1" dirty="0">
+                <a:solidFill>
+                  <a:srgbClr val="FF0000"/>
+                </a:solidFill>
+              </a:rPr>
+              <a:t>-portrayal/2.0 </a:t>
+            </a:r>
+            <a:r>
+              <a:rPr lang="en-US" sz="8000" b="1" dirty="0">
+                <a:solidFill>
+                  <a:srgbClr val="FF0000"/>
+                </a:solidFill>
+              </a:rPr>
+              <a:t>http://</a:t>
+            </a:r>
+            <a:r>
+              <a:rPr lang="en-US" sz="8000" b="1" dirty="0" smtClean="0">
+                <a:solidFill>
+                  <a:srgbClr val="FF0000"/>
+                </a:solidFill>
+              </a:rPr>
+              <a:t>schemas.geosciml.org/geosciml-portrayal/2.0/geosciml-portrayal.xsd </a:t>
+            </a:r>
+            <a:endParaRPr lang="en-US" sz="6400" b="1" dirty="0" smtClean="0">
+              <a:solidFill>
+                <a:srgbClr val="FF0000"/>
+              </a:solidFill>
+            </a:endParaRPr>
+          </a:p>
+          <a:p>
+            <a:pPr marL="0" indent="0">
+              <a:lnSpc>
+                <a:spcPct val="143000"/>
+              </a:lnSpc>
+              <a:buNone/>
+            </a:pPr>
+            <a:r>
+              <a:rPr lang="en-US" sz="6400" dirty="0" smtClean="0"/>
+              <a:t>http</a:t>
+            </a:r>
+            <a:r>
+              <a:rPr lang="en-US" sz="6400" dirty="0"/>
+              <a:t>://www.opengis.net/gml http://schemas.opengis.net/gml/3.1.1/base/gml.xsd </a:t>
+            </a:r>
+            <a:endParaRPr lang="en-US" sz="6400" dirty="0" smtClean="0"/>
+          </a:p>
+          <a:p>
+            <a:pPr marL="0" indent="0">
+              <a:lnSpc>
+                <a:spcPct val="143000"/>
+              </a:lnSpc>
+              <a:buNone/>
+            </a:pPr>
+            <a:r>
+              <a:rPr lang="en-US" sz="6400" dirty="0" smtClean="0"/>
+              <a:t>http</a:t>
+            </a:r>
+            <a:r>
+              <a:rPr lang="en-US" sz="6400" dirty="0"/>
+              <a:t>://www.opengis.net/ogc http://schemas.opengis.net/filter/1.1.0/filter.xsd </a:t>
+            </a:r>
+            <a:endParaRPr lang="en-US" sz="6400" dirty="0" smtClean="0"/>
+          </a:p>
+          <a:p>
+            <a:pPr marL="0" indent="0">
+              <a:lnSpc>
+                <a:spcPct val="143000"/>
+              </a:lnSpc>
+              <a:buNone/>
+            </a:pPr>
+            <a:r>
+              <a:rPr lang="en-US" sz="6400" dirty="0" smtClean="0"/>
+              <a:t>http</a:t>
+            </a:r>
+            <a:r>
+              <a:rPr lang="en-US" sz="6400" dirty="0"/>
+              <a:t>://www.opengis.net/ows http://schemas.opengis.net/ows/1.0.0/owsAll.xsd </a:t>
+            </a:r>
+            <a:endParaRPr lang="en-US" sz="6400" dirty="0" smtClean="0"/>
+          </a:p>
+          <a:p>
+            <a:pPr marL="0" indent="0">
+              <a:lnSpc>
+                <a:spcPct val="143000"/>
+              </a:lnSpc>
+              <a:buNone/>
+            </a:pPr>
+            <a:r>
+              <a:rPr lang="en-US" sz="6400" dirty="0" smtClean="0"/>
+              <a:t>http</a:t>
+            </a:r>
+            <a:r>
+              <a:rPr lang="en-US" sz="6400" dirty="0"/>
+              <a:t>://www.opengis.net/wfs http://schemas.opengis.net/wfs/1.1.0/wfs.xsd' </a:t>
+            </a:r>
+            <a:endParaRPr lang="en-US" sz="6400" dirty="0" smtClean="0"/>
+          </a:p>
+          <a:p>
+            <a:pPr marL="0" indent="0">
+              <a:lnSpc>
+                <a:spcPct val="143000"/>
+              </a:lnSpc>
+              <a:buNone/>
+            </a:pPr>
+            <a:r>
+              <a:rPr lang="en-US" sz="8000" b="1" dirty="0" err="1" smtClean="0">
+                <a:solidFill>
+                  <a:srgbClr val="0070C0"/>
+                </a:solidFill>
+              </a:rPr>
+              <a:t>xmlns:gsmlp</a:t>
+            </a:r>
+            <a:r>
+              <a:rPr lang="en-US" sz="8000" b="1" dirty="0">
+                <a:solidFill>
+                  <a:srgbClr val="0070C0"/>
+                </a:solidFill>
+              </a:rPr>
+              <a:t>='http://</a:t>
+            </a:r>
+            <a:r>
+              <a:rPr lang="en-US" sz="8000" b="1" dirty="0" smtClean="0">
+                <a:solidFill>
+                  <a:srgbClr val="0070C0"/>
+                </a:solidFill>
+              </a:rPr>
+              <a:t>xmlns.geosciml.org/</a:t>
+            </a:r>
+            <a:r>
+              <a:rPr lang="en-US" sz="8000" b="1" dirty="0" err="1" smtClean="0">
+                <a:solidFill>
+                  <a:srgbClr val="0070C0"/>
+                </a:solidFill>
+              </a:rPr>
+              <a:t>geosciml</a:t>
+            </a:r>
+            <a:r>
+              <a:rPr lang="en-US" sz="8000" b="1" dirty="0" smtClean="0">
+                <a:solidFill>
+                  <a:srgbClr val="0070C0"/>
+                </a:solidFill>
+              </a:rPr>
+              <a:t>-portrayal/2.0</a:t>
+            </a:r>
+            <a:r>
+              <a:rPr lang="en-US" sz="8000" b="1" dirty="0" smtClean="0"/>
+              <a:t>’</a:t>
+            </a:r>
+            <a:endParaRPr lang="en-US" sz="8000" b="1" dirty="0" smtClean="0"/>
+          </a:p>
+          <a:p>
+            <a:pPr marL="0" indent="0">
+              <a:lnSpc>
+                <a:spcPct val="143000"/>
+              </a:lnSpc>
+              <a:buNone/>
+            </a:pPr>
+            <a:r>
+              <a:rPr lang="en-US" sz="6400" dirty="0" err="1" smtClean="0"/>
+              <a:t>xmlns:wfs</a:t>
+            </a:r>
+            <a:r>
+              <a:rPr lang="en-US" sz="6400" dirty="0"/>
+              <a:t>='http://www.opengis.net/wfs' </a:t>
+            </a:r>
+            <a:r>
+              <a:rPr lang="en-US" sz="6400" dirty="0" err="1"/>
+              <a:t>xmlns:ogc</a:t>
+            </a:r>
+            <a:r>
+              <a:rPr lang="en-US" sz="6400" dirty="0"/>
+              <a:t>='http://www.opengis.net/ogc' </a:t>
+            </a:r>
+            <a:r>
+              <a:rPr lang="en-US" sz="6400" dirty="0" err="1"/>
+              <a:t>xmlns:gml</a:t>
+            </a:r>
+            <a:r>
+              <a:rPr lang="en-US" sz="6400" dirty="0"/>
+              <a:t>='http://www.opengis.net/gml' </a:t>
+            </a:r>
+            <a:r>
+              <a:rPr lang="en-US" sz="6400" dirty="0" err="1"/>
+              <a:t>xmlns:ows</a:t>
+            </a:r>
+            <a:r>
+              <a:rPr lang="en-US" sz="6400" dirty="0"/>
+              <a:t>='http://www.opengis.net/ows' </a:t>
+            </a:r>
+            <a:r>
+              <a:rPr lang="en-US" sz="6400" dirty="0" err="1"/>
+              <a:t>xmlns:xsi</a:t>
+            </a:r>
+            <a:r>
+              <a:rPr lang="en-US" sz="6400" dirty="0"/>
+              <a:t>='http://www.w3.org/2001/XMLSchema-instance' </a:t>
+            </a:r>
+            <a:r>
+              <a:rPr lang="en-US" sz="6400" dirty="0" err="1"/>
+              <a:t>xmlns:xlink</a:t>
+            </a:r>
+            <a:r>
+              <a:rPr lang="en-US" sz="6400" dirty="0"/>
+              <a:t>='http://www.w3.org/1999/xlink' </a:t>
+            </a:r>
+            <a:r>
+              <a:rPr lang="en-US" sz="6400" dirty="0" smtClean="0"/>
+              <a:t>&gt;</a:t>
+            </a:r>
+            <a:endParaRPr lang="en-US" sz="6400" dirty="0"/>
+          </a:p>
+        </p:txBody>
+      </p:sp>
+    </p:spTree>
+    <p:extLst>
+      <p:ext uri="{BB962C8B-B14F-4D97-AF65-F5344CB8AC3E}">
+        <p14:creationId xmlns:p14="http://schemas.microsoft.com/office/powerpoint/2010/main" val="3481341416"/>
+      </p:ext>
+    </p:extLst>
+  </p:cSld>
+  <p:clrMapOvr>
+    <a:masterClrMapping/>
+  </p:clrMapOvr>
+</p:sld>
+</file>
+
+<file path=ppt/slides/slide18.xml><?xml version="1.0" encoding="utf-8"?>
+<p:sld xmlns:a="http://schemas.openxmlformats.org/drawingml/2006/main" xmlns:r="http://schemas.openxmlformats.org/officeDocument/2006/relationships" xmlns:p="http://schemas.openxmlformats.org/presentationml/2006/main">
+  <p:cSld>
+    <p:spTree>
+      <p:nvGrpSpPr>
+        <p:cNvPr id="1" name=""/>
+        <p:cNvGrpSpPr/>
+        <p:nvPr/>
+      </p:nvGrpSpPr>
+      <p:grpSpPr>
+        <a:xfrm>
+          <a:off x="0" y="0"/>
+          <a:ext cx="0" cy="0"/>
+          <a:chOff x="0" y="0"/>
+          <a:chExt cx="0" cy="0"/>
+        </a:xfrm>
+      </p:grpSpPr>
+      <p:sp>
+        <p:nvSpPr>
+          <p:cNvPr id="2" name="Title 1"/>
+          <p:cNvSpPr>
+            <a:spLocks noGrp="1"/>
+          </p:cNvSpPr>
+          <p:nvPr>
+            <p:ph type="title"/>
+          </p:nvPr>
+        </p:nvSpPr>
+        <p:spPr/>
+        <p:txBody>
+          <a:bodyPr/>
+          <a:lstStyle/>
+          <a:p>
+            <a:pPr algn="l"/>
+            <a:r>
+              <a:rPr lang="en-US" i="1" smtClean="0"/>
+              <a:t>Enable Custom </a:t>
+            </a:r>
+            <a:r>
+              <a:rPr lang="en-US" i="1"/>
+              <a:t>Capabilities</a:t>
+            </a:r>
+            <a:endParaRPr lang="en-US"/>
+          </a:p>
+        </p:txBody>
+      </p:sp>
+      <p:sp>
+        <p:nvSpPr>
+          <p:cNvPr id="3" name="Content Placeholder 2"/>
+          <p:cNvSpPr>
+            <a:spLocks noGrp="1"/>
+          </p:cNvSpPr>
+          <p:nvPr>
+            <p:ph idx="1"/>
+          </p:nvPr>
+        </p:nvSpPr>
+        <p:spPr/>
+        <p:txBody>
+          <a:bodyPr>
+            <a:normAutofit/>
+          </a:bodyPr>
+          <a:lstStyle/>
+          <a:p>
+            <a:pPr lvl="0"/>
+            <a:r>
+              <a:rPr lang="en-US" sz="2800"/>
+              <a:t>Stop the service in ArcServer or ArcServer </a:t>
+            </a:r>
+            <a:r>
+              <a:rPr lang="en-US" sz="2800" smtClean="0"/>
+              <a:t>Manager</a:t>
+            </a:r>
+            <a:endParaRPr lang="en-US" sz="2800"/>
+          </a:p>
+          <a:p>
+            <a:pPr lvl="0"/>
+            <a:r>
+              <a:rPr lang="en-US" sz="2800" smtClean="0"/>
+              <a:t>Right-click </a:t>
+            </a:r>
+            <a:r>
+              <a:rPr lang="en-US" sz="2800"/>
+              <a:t>on the service and select </a:t>
+            </a:r>
+          </a:p>
+          <a:p>
+            <a:pPr marL="0" lvl="0" indent="0">
+              <a:buNone/>
+            </a:pPr>
+            <a:r>
+              <a:rPr lang="en-US" sz="2800" i="1" smtClean="0"/>
+              <a:t>Service Properties </a:t>
+            </a:r>
+            <a:endParaRPr lang="en-US" sz="2800" i="1"/>
+          </a:p>
+          <a:p>
+            <a:pPr lvl="0"/>
+            <a:r>
+              <a:rPr lang="en-US" sz="2800"/>
+              <a:t>Navigate to the </a:t>
+            </a:r>
+            <a:r>
+              <a:rPr lang="en-US" sz="2800" i="1"/>
+              <a:t>Capabilities</a:t>
+            </a:r>
+            <a:r>
+              <a:rPr lang="en-US" sz="2800"/>
+              <a:t> tab and select </a:t>
+            </a:r>
+            <a:r>
+              <a:rPr lang="en-US" sz="2800" i="1" smtClean="0"/>
+              <a:t>WMS</a:t>
+            </a:r>
+            <a:r>
+              <a:rPr lang="en-US" sz="2800" smtClean="0"/>
+              <a:t> </a:t>
+            </a:r>
+            <a:endParaRPr lang="en-US" sz="2800"/>
+          </a:p>
+          <a:p>
+            <a:pPr lvl="0"/>
+            <a:r>
+              <a:rPr lang="en-US" sz="2800"/>
+              <a:t>Select </a:t>
+            </a:r>
+            <a:r>
+              <a:rPr lang="en-US" sz="2800" i="1"/>
+              <a:t>Use External Capabilities files</a:t>
+            </a:r>
+            <a:r>
+              <a:rPr lang="en-US" sz="2800"/>
+              <a:t>. Specify the location and prefix, for example:</a:t>
+            </a:r>
+          </a:p>
+          <a:p>
+            <a:pPr marL="0" indent="0">
+              <a:buNone/>
+            </a:pPr>
+            <a:r>
+              <a:rPr lang="en-US" sz="2800">
+                <a:solidFill>
+                  <a:schemeClr val="tx2"/>
+                </a:solidFill>
+              </a:rPr>
+              <a:t>http://</a:t>
             </a:r>
             <a:r>
               <a:rPr lang="en-US" sz="2800" smtClean="0">
@@ -4252,11 +5060,7 @@
             <a:pPr lvl="0"/>
             <a:r>
               <a:rPr lang="en-US" sz="2800"/>
-              <a:t>Restart </a:t>
-            </a:r>
-            <a:r>
-              <a:rPr lang="en-US" sz="2800"/>
-              <a:t>the </a:t>
+              <a:t>Restart the </a:t>
             </a:r>
             <a:r>
               <a:rPr lang="en-US" sz="2800" smtClean="0"/>
@@ -4279,7 +5083,7 @@
 </p:sld>
 </file>
 
-<file path=ppt/slides/slide15.xml><?xml version="1.0" encoding="utf-8"?>
+<file path=ppt/slides/slide19.xml><?xml version="1.0" encoding="utf-8"?>
 <p:sld xmlns:a="http://schemas.openxmlformats.org/drawingml/2006/main" xmlns:r="http://schemas.openxmlformats.org/officeDocument/2006/relationships" xmlns:p="http://schemas.openxmlformats.org/presentationml/2006/main">
   <p:cSld>
     <p:spTree>
@@ -4487,140 +5291,135 @@
         </p:spPr>
         <p:txBody>
           <a:bodyPr>
-            <a:normAutofit fontScale="70000" lnSpcReduction="20000"/>
+            <a:normAutofit fontScale="92500" lnSpcReduction="10000"/>
           </a:bodyPr>
           <a:lstStyle/>
           <a:p>
             <a:r>
-              <a:rPr lang="en-US"/>
+              <a:rPr lang="en-US" dirty="0"/>
               <a:t>Introduction: OneGeology </a:t>
             </a:r>
             <a:r>
-              <a:rPr lang="en-US" smtClean="0"/>
+              <a:rPr lang="en-US" dirty="0" smtClean="0"/>
               <a:t>USA</a:t>
             </a:r>
           </a:p>
           <a:p>
             <a:pPr lvl="0"/>
             <a:r>
-              <a:rPr lang="en-US" smtClean="0"/>
+              <a:rPr lang="en-US" dirty="0" smtClean="0"/>
               <a:t>Naming </a:t>
             </a:r>
             <a:r>
-              <a:rPr lang="en-US"/>
+              <a:rPr lang="en-US" dirty="0"/>
               <a:t>conventions</a:t>
             </a:r>
           </a:p>
           <a:p>
             <a:pPr lvl="0"/>
             <a:r>
-              <a:rPr lang="en-US"/>
-              <a:t>GeoSciML-Portrayal specifications for WFS layers</a:t>
+              <a:rPr lang="en-US" dirty="0"/>
+              <a:t>GeoSciML-Portrayal </a:t>
+            </a:r>
+            <a:r>
+              <a:rPr lang="en-US" dirty="0" smtClean="0"/>
+              <a:t>specification</a:t>
+            </a:r>
+            <a:endParaRPr lang="en-US" dirty="0"/>
+          </a:p>
+          <a:p>
+            <a:pPr lvl="0"/>
+            <a:r>
+              <a:rPr lang="en-US" dirty="0" smtClean="0"/>
+              <a:t>Symbolization: Layer </a:t>
+            </a:r>
+            <a:r>
+              <a:rPr lang="en-US" dirty="0"/>
+              <a:t>files and </a:t>
+            </a:r>
+            <a:r>
+              <a:rPr lang="en-US" dirty="0" smtClean="0"/>
+              <a:t>SLDs</a:t>
+            </a:r>
+            <a:endParaRPr lang="en-US" dirty="0"/>
+          </a:p>
+          <a:p>
+            <a:pPr lvl="0"/>
+            <a:r>
+              <a:rPr lang="en-US" dirty="0" smtClean="0"/>
+              <a:t>Deploying services: Custom </a:t>
+            </a:r>
+            <a:r>
+              <a:rPr lang="en-US" dirty="0"/>
+              <a:t>Capabilities </a:t>
+            </a:r>
+            <a:r>
+              <a:rPr lang="en-US" dirty="0" smtClean="0"/>
+              <a:t>and metadata </a:t>
+            </a:r>
+          </a:p>
+          <a:p>
+            <a:pPr lvl="0"/>
+            <a:r>
+              <a:rPr lang="en-US" dirty="0" smtClean="0"/>
+              <a:t>Demo </a:t>
+            </a:r>
+            <a:endParaRPr lang="en-US" dirty="0" smtClean="0"/>
+          </a:p>
+          <a:p>
+            <a:pPr lvl="0"/>
+            <a:r>
+              <a:rPr lang="en-US" dirty="0" smtClean="0"/>
+              <a:t>OneGeology</a:t>
             </a:r>
           </a:p>
           <a:p>
             <a:pPr lvl="1"/>
             <a:r>
-              <a:rPr lang="en-US"/>
-              <a:t>Review the GeoSciML-Portayal schema at the GitHub repository (</a:t>
-            </a:r>
-            <a:r>
-              <a:rPr lang="en-US" u="sng">
+              <a:rPr lang="en-US" dirty="0" smtClean="0"/>
+              <a:t>Registering services</a:t>
+            </a:r>
+          </a:p>
+          <a:p>
+            <a:pPr lvl="1"/>
+            <a:r>
+              <a:rPr lang="en-US" dirty="0" smtClean="0"/>
+              <a:t>The portal</a:t>
+            </a:r>
+            <a:r>
+              <a:rPr lang="en-US" dirty="0"/>
+              <a:t> </a:t>
+            </a:r>
+            <a:r>
+              <a:rPr lang="en-US" dirty="0" smtClean="0"/>
+              <a:t> </a:t>
+            </a:r>
+            <a:r>
+              <a:rPr lang="en-US" dirty="0" smtClean="0"/>
+              <a:t>(</a:t>
+            </a:r>
+            <a:r>
+              <a:rPr lang="en-US" u="sng" dirty="0" smtClean="0">
                 <a:hlinkClick r:id="rId2"/>
               </a:rPr>
-              <a:t>https://github.com/usgin-models/GeoSciML-Portrayal</a:t>
-            </a:r>
-            <a:r>
-              <a:rPr lang="en-US"/>
+              <a:t>http</a:t>
+            </a:r>
+            <a:r>
+              <a:rPr lang="en-US" u="sng" dirty="0">
+                <a:hlinkClick r:id="rId2"/>
+              </a:rPr>
+              <a:t>://portal.onegeology.org/</a:t>
+            </a:r>
+            <a:r>
+              <a:rPr lang="en-US" dirty="0"/>
               <a:t>)</a:t>
             </a:r>
           </a:p>
           <a:p>
-            <a:pPr lvl="1"/>
-            <a:r>
-              <a:rPr lang="en-US"/>
-              <a:t>Required namespace</a:t>
-            </a:r>
-          </a:p>
-          <a:p>
-            <a:pPr lvl="1"/>
-            <a:r>
-              <a:rPr lang="en-US"/>
-              <a:t>Required prefix </a:t>
-            </a:r>
-          </a:p>
-          <a:p>
-            <a:pPr lvl="1"/>
-            <a:r>
-              <a:rPr lang="en-US"/>
-              <a:t>What to do with that pesky OBJECTID field</a:t>
-            </a:r>
-          </a:p>
-          <a:p>
-            <a:pPr lvl="1"/>
-            <a:r>
-              <a:rPr lang="en-US"/>
-              <a:t>Making your WFS service validate</a:t>
-            </a:r>
-          </a:p>
-          <a:p>
-            <a:pPr lvl="0"/>
-            <a:r>
-              <a:rPr lang="en-US"/>
-              <a:t>Layer files and SLDs for WMS layers </a:t>
-            </a:r>
-          </a:p>
-          <a:p>
-            <a:pPr lvl="0"/>
-            <a:r>
-              <a:rPr lang="en-US"/>
-              <a:t>Custom Capabilities </a:t>
-            </a:r>
-            <a:r>
-              <a:rPr lang="en-US" smtClean="0"/>
-              <a:t>and metadata </a:t>
-            </a:r>
-          </a:p>
-          <a:p>
-            <a:pPr lvl="0"/>
-            <a:r>
-              <a:rPr lang="en-US" smtClean="0"/>
-              <a:t>Demo </a:t>
-            </a:r>
-            <a:r>
-              <a:rPr lang="en-US"/>
-              <a:t>WFS and WMS services with ArcMap and GeoServer (with schema resolution)</a:t>
-            </a:r>
-          </a:p>
-          <a:p>
-            <a:pPr lvl="0"/>
-            <a:r>
-              <a:rPr lang="en-US"/>
-              <a:t>Registering your services with OneGeology</a:t>
-            </a:r>
-          </a:p>
-          <a:p>
-            <a:pPr lvl="0"/>
-            <a:r>
-              <a:rPr lang="en-US"/>
-              <a:t>Navigating the OneGeology portal (</a:t>
-            </a:r>
-            <a:r>
-              <a:rPr lang="en-US" u="sng">
-                <a:hlinkClick r:id="rId3"/>
-              </a:rPr>
-              <a:t>http://portal.onegeology.org/</a:t>
-            </a:r>
-            <a:r>
-              <a:rPr lang="en-US"/>
-              <a:t>)</a:t>
-            </a:r>
-          </a:p>
-          <a:p>
             <a:pPr marL="0" indent="0">
               <a:buNone/>
             </a:pPr>
-            <a:endParaRPr lang="en-US"/>
+            <a:endParaRPr lang="en-US" dirty="0"/>
           </a:p>
         </p:txBody>
       </p:sp>
@@ -4664,268 +5463,86 @@
             <p:ph type="title"/>
           </p:nvPr>
         </p:nvSpPr>
-        <p:spPr>
-          <a:xfrm>
-            <a:off x="381000" y="228600"/>
-            <a:ext cx="8458200" cy="1143000"/>
-          </a:xfrm>
-        </p:spPr>
+        <p:spPr/>
+        <p:txBody>
+          <a:bodyPr/>
+          <a:lstStyle/>
+          <a:p>
+            <a:r>
+              <a:rPr lang="en-US" dirty="0" smtClean="0"/>
+              <a:t>Web services for map data</a:t>
+            </a:r>
+            <a:endParaRPr lang="en-US" dirty="0"/>
+          </a:p>
+        </p:txBody>
+      </p:sp>
+      <p:sp>
+        <p:nvSpPr>
+          <p:cNvPr id="3" name="Content Placeholder 2"/>
+          <p:cNvSpPr>
+            <a:spLocks noGrp="1"/>
+          </p:cNvSpPr>
+          <p:nvPr>
+            <p:ph idx="1"/>
+          </p:nvPr>
+        </p:nvSpPr>
+        <p:spPr/>
         <p:txBody>
           <a:bodyPr>
-            <a:normAutofit/>
+            <a:normAutofit lnSpcReduction="10000"/>
           </a:bodyPr>
           <a:lstStyle/>
           <a:p>
-            <a:pPr algn="l"/>
-            <a:r>
-              <a:rPr lang="en-US" i="1" smtClean="0"/>
-              <a:t>WMS service name specifications</a:t>
-            </a:r>
-            <a:endParaRPr lang="en-US" i="1"/>
-          </a:p>
-        </p:txBody>
-      </p:sp>
-      <p:sp>
-        <p:nvSpPr>
-          <p:cNvPr id="3" name="Content Placeholder 2"/>
-          <p:cNvSpPr>
-            <a:spLocks noGrp="1"/>
-          </p:cNvSpPr>
-          <p:nvPr>
-            <p:ph idx="1"/>
-          </p:nvPr>
-        </p:nvSpPr>
-        <p:spPr/>
-        <p:txBody>
-          <a:bodyPr>
-            <a:normAutofit fontScale="70000" lnSpcReduction="20000"/>
-          </a:bodyPr>
-          <a:lstStyle/>
-          <a:p>
-            <a:pPr marL="0" indent="0">
-              <a:buNone/>
-            </a:pPr>
-            <a:r>
-              <a:rPr lang="en-US"/>
-              <a:t>Layer</a:t>
-            </a:r>
-            <a:r>
-              <a:rPr lang="en-US" b="1"/>
-              <a:t> </a:t>
-            </a:r>
-            <a:r>
-              <a:rPr lang="en-US"/>
-              <a:t>names variable, but must adhere to specified </a:t>
-            </a:r>
-            <a:r>
-              <a:rPr lang="en-US" smtClean="0"/>
-              <a:t>format:</a:t>
-            </a:r>
-            <a:endParaRPr lang="en-US"/>
-          </a:p>
-          <a:p>
-            <a:pPr marL="514350" indent="-514350">
-              <a:buFont typeface="+mj-lt"/>
-              <a:buAutoNum type="arabicPeriod"/>
-            </a:pPr>
-            <a:r>
-              <a:rPr lang="en-US"/>
-              <a:t>Geographic E</a:t>
-            </a:r>
-            <a:r>
-              <a:rPr lang="en-US" smtClean="0"/>
-              <a:t>xtent, </a:t>
-            </a:r>
-            <a:r>
-              <a:rPr lang="en-US" i="1"/>
-              <a:t>Example:  </a:t>
-            </a:r>
-            <a:r>
-              <a:rPr lang="en-US" smtClean="0"/>
-              <a:t>US-</a:t>
-            </a:r>
-          </a:p>
-          <a:p>
-            <a:pPr marL="514350" indent="-514350">
-              <a:buFont typeface="+mj-lt"/>
-              <a:buAutoNum type="arabicPeriod"/>
-            </a:pPr>
-            <a:r>
-              <a:rPr lang="en-US" smtClean="0"/>
-              <a:t>Data Owner Organization Code, </a:t>
-            </a:r>
-            <a:r>
-              <a:rPr lang="en-US" i="1" smtClean="0"/>
-              <a:t>Example: </a:t>
-            </a:r>
-            <a:r>
-              <a:rPr lang="en-US" smtClean="0"/>
-              <a:t>IL</a:t>
-            </a:r>
-          </a:p>
-          <a:p>
-            <a:pPr marL="514350" indent="-514350">
-              <a:buFont typeface="+mj-lt"/>
-              <a:buAutoNum type="arabicPeriod"/>
-            </a:pPr>
-            <a:r>
-              <a:rPr lang="en-US" smtClean="0"/>
-              <a:t>Language Code, if name language differs from data language</a:t>
-            </a:r>
-            <a:endParaRPr lang="en-US"/>
-          </a:p>
-          <a:p>
-            <a:pPr marL="514350" indent="-514350">
-              <a:buFont typeface="+mj-lt"/>
-              <a:buAutoNum type="arabicPeriod"/>
-            </a:pPr>
-            <a:r>
-              <a:rPr lang="en-US" smtClean="0"/>
-              <a:t>Theme</a:t>
-            </a:r>
-            <a:r>
-              <a:rPr lang="en-US"/>
-              <a:t>, </a:t>
-            </a:r>
-            <a:r>
-              <a:rPr lang="en-US" i="1"/>
-              <a:t>Example: </a:t>
-            </a:r>
-            <a:r>
-              <a:rPr lang="en-US"/>
-              <a:t>Bedrock Age  or  </a:t>
-            </a:r>
-          </a:p>
-          <a:p>
-            <a:pPr marL="0" indent="0">
-              <a:buNone/>
-            </a:pPr>
-            <a:r>
-              <a:rPr lang="en-US"/>
-              <a:t>	</a:t>
-            </a:r>
-            <a:r>
-              <a:rPr lang="en-US" smtClean="0"/>
-              <a:t>	           Surficial </a:t>
-            </a:r>
-            <a:r>
-              <a:rPr lang="en-US"/>
-              <a:t>Lithology</a:t>
-            </a:r>
-          </a:p>
-          <a:p>
-            <a:pPr marL="0" indent="0">
-              <a:buNone/>
-            </a:pPr>
-            <a:endParaRPr lang="en-US" i="1"/>
-          </a:p>
-          <a:p>
-            <a:pPr marL="0" indent="0">
-              <a:buNone/>
-            </a:pPr>
-            <a:r>
-              <a:rPr lang="en-US" i="1" smtClean="0"/>
-              <a:t>Service Name Example</a:t>
-            </a:r>
-            <a:r>
-              <a:rPr lang="en-US" i="1"/>
-              <a:t>: </a:t>
-            </a:r>
-            <a:r>
-              <a:rPr lang="en-US"/>
-              <a:t> </a:t>
-            </a:r>
-            <a:r>
-              <a:rPr lang="en-US" smtClean="0"/>
-              <a:t>US-IL </a:t>
-            </a:r>
-            <a:r>
-              <a:rPr lang="en-US"/>
-              <a:t>Bedrock Age</a:t>
-            </a:r>
-          </a:p>
-          <a:p>
-            <a:pPr marL="0" indent="0">
-              <a:buNone/>
-            </a:pPr>
-            <a:r>
-              <a:rPr lang="en-US" i="1"/>
-              <a:t>		</a:t>
-            </a:r>
-            <a:r>
-              <a:rPr lang="en-US" i="1" smtClean="0"/>
-              <a:t>	</a:t>
-            </a:r>
-            <a:r>
-              <a:rPr lang="en-US" smtClean="0"/>
-              <a:t>US-IL Surficial </a:t>
-            </a:r>
-            <a:r>
-              <a:rPr lang="en-US"/>
-              <a:t>Lithology</a:t>
-            </a:r>
-            <a:endParaRPr lang="en-US" i="1"/>
-          </a:p>
-          <a:p>
-            <a:pPr marL="0" lvl="1" indent="0">
-              <a:buNone/>
-            </a:pPr>
-            <a:endParaRPr lang="en-US" sz="900" smtClean="0"/>
-          </a:p>
-          <a:p>
-            <a:pPr marL="0" lvl="1" indent="0">
-              <a:buNone/>
-            </a:pPr>
-            <a:endParaRPr lang="en-US" smtClean="0"/>
-          </a:p>
-          <a:p>
-            <a:pPr marL="0" lvl="1" indent="0">
-              <a:buNone/>
-            </a:pPr>
-            <a:r>
-              <a:rPr lang="en-US" i="1" smtClean="0"/>
-              <a:t>Service URL Example:  </a:t>
-            </a:r>
-            <a:r>
-              <a:rPr lang="en-US" smtClean="0"/>
-              <a:t>US-IL_Bedrock_Geology</a:t>
-            </a:r>
-          </a:p>
-          <a:p>
-            <a:pPr marL="0" lvl="1" indent="0">
-              <a:buNone/>
-            </a:pPr>
-            <a:endParaRPr lang="en-US" smtClean="0">
-              <a:hlinkClick r:id="rId2"/>
-            </a:endParaRPr>
-          </a:p>
-          <a:p>
-            <a:pPr marL="0" lvl="1" indent="0">
-              <a:buNone/>
-            </a:pPr>
-            <a:r>
-              <a:rPr lang="en-US" smtClean="0">
-                <a:hlinkClick r:id="rId2"/>
-              </a:rPr>
-              <a:t>http://www.onegeology.com/wmsCookbook/2_2.html</a:t>
-            </a:r>
-            <a:r>
-              <a:rPr lang="en-US" smtClean="0"/>
-              <a:t> </a:t>
-            </a:r>
-          </a:p>
-          <a:p>
-            <a:pPr marL="0" indent="0">
-              <a:buNone/>
-            </a:pPr>
-            <a:endParaRPr lang="en-US" b="1"/>
+            <a:r>
+              <a:rPr lang="en-US" dirty="0" err="1" smtClean="0"/>
+              <a:t>OpenGeospatial</a:t>
+            </a:r>
+            <a:r>
+              <a:rPr lang="en-US" dirty="0" smtClean="0"/>
+              <a:t> Consortium</a:t>
+            </a:r>
+          </a:p>
+          <a:p>
+            <a:r>
+              <a:rPr lang="en-US" dirty="0" smtClean="0"/>
+              <a:t>Web Map service– a georeferenced image, and a ‘get info’ click</a:t>
+            </a:r>
+          </a:p>
+          <a:p>
+            <a:r>
+              <a:rPr lang="en-US" dirty="0" smtClean="0"/>
+              <a:t>Web Feature service – request and receive structured data, records for individual features</a:t>
+            </a:r>
+          </a:p>
+          <a:p>
+            <a:pPr lvl="1"/>
+            <a:r>
+              <a:rPr lang="en-US" dirty="0" smtClean="0"/>
+              <a:t>A feature is a </a:t>
+            </a:r>
+            <a:r>
+              <a:rPr lang="en-US" dirty="0" err="1" smtClean="0"/>
+              <a:t>geolocated</a:t>
+            </a:r>
+            <a:r>
+              <a:rPr lang="en-US" dirty="0" smtClean="0"/>
+              <a:t> thing that someone is interested in</a:t>
+            </a:r>
+          </a:p>
+          <a:p>
+            <a:pPr lvl="1"/>
+            <a:r>
+              <a:rPr lang="en-US" dirty="0" smtClean="0"/>
+              <a:t>WFS allows dataset to be filtered before download, and provides GIS data</a:t>
+            </a:r>
+            <a:endParaRPr lang="en-US" dirty="0"/>
           </a:p>
         </p:txBody>
       </p:sp>
     </p:spTree>
     <p:extLst>
       <p:ext uri="{BB962C8B-B14F-4D97-AF65-F5344CB8AC3E}">
-        <p14:creationId xmlns:p14="http://schemas.microsoft.com/office/powerpoint/2010/main" val="1042319510"/>
+        <p14:creationId xmlns:p14="http://schemas.microsoft.com/office/powerpoint/2010/main" val="3258710410"/>
       </p:ext>
     </p:extLst>
   </p:cSld>
@@ -4967,12 +5584,11 @@
           <a:bodyPr/>
           <a:lstStyle/>
           <a:p>
-            <a:pPr algn="l"/>
-            <a:r>
-              <a:rPr lang="en-US" i="1" smtClean="0"/>
-              <a:t>WFS service name specifications</a:t>
-            </a:r>
-            <a:endParaRPr lang="en-US" i="1"/>
+            <a:r>
+              <a:rPr lang="en-US" dirty="0" smtClean="0"/>
+              <a:t>OneGeology</a:t>
+            </a:r>
+            <a:endParaRPr lang="en-US" dirty="0"/>
           </a:p>
         </p:txBody>
       </p:sp>
@@ -4989,103 +5605,66 @@
         <p:spPr/>
         <p:txBody>
           <a:bodyPr>
-            <a:normAutofit fontScale="92500" lnSpcReduction="20000"/>
+            <a:normAutofit/>
           </a:bodyPr>
           <a:lstStyle/>
           <a:p>
             <a:r>
-              <a:rPr lang="en-US" smtClean="0"/>
-              <a:t>Service naming conventions for WFS are specified only in so far that they closely resemble the accompanying WMS</a:t>
-            </a:r>
-          </a:p>
-          <a:p>
-            <a:pPr marL="0" indent="0">
-              <a:buNone/>
-            </a:pPr>
-            <a:endParaRPr lang="en-US" sz="800" smtClean="0"/>
-          </a:p>
-          <a:p>
-            <a:r>
-              <a:rPr lang="en-US" smtClean="0"/>
-              <a:t>For clarity, good practice might be:</a:t>
-            </a:r>
-          </a:p>
-          <a:p>
-            <a:pPr marL="0" indent="0">
-              <a:buNone/>
-            </a:pPr>
-            <a:endParaRPr lang="en-US" sz="1400" smtClean="0"/>
-          </a:p>
-          <a:p>
-            <a:pPr marL="0" indent="0">
-              <a:buNone/>
-            </a:pPr>
-            <a:r>
-              <a:rPr lang="en-US" smtClean="0"/>
-              <a:t>Same as WMS, only affixed with “_WFS”</a:t>
-            </a:r>
-          </a:p>
-          <a:p>
-            <a:pPr marL="0" indent="0">
-              <a:buNone/>
-            </a:pPr>
-            <a:endParaRPr lang="en-US" sz="1400"/>
-          </a:p>
-          <a:p>
-            <a:pPr marL="0" lvl="1" indent="0">
-              <a:buNone/>
-            </a:pPr>
-            <a:r>
-              <a:rPr lang="en-US" i="1" smtClean="0"/>
-              <a:t>Service URL Example:  </a:t>
-            </a:r>
-            <a:r>
-              <a:rPr lang="en-US" smtClean="0"/>
-              <a:t>US-IL_Bedrock_Geology_WFS</a:t>
-            </a:r>
-          </a:p>
-          <a:p>
-            <a:pPr marL="0" indent="0">
-              <a:buNone/>
-            </a:pPr>
-            <a:endParaRPr lang="en-US" u="sng" smtClean="0">
-              <a:hlinkClick r:id="rId2"/>
-            </a:endParaRPr>
-          </a:p>
-          <a:p>
-            <a:pPr marL="0" indent="0">
-              <a:buNone/>
-            </a:pPr>
-            <a:r>
-              <a:rPr lang="en-US" sz="2800" u="sng" smtClean="0">
-                <a:hlinkClick r:id="rId2"/>
-              </a:rPr>
-              <a:t>http</a:t>
-            </a:r>
-            <a:r>
-              <a:rPr lang="en-US" sz="2800" u="sng">
-                <a:hlinkClick r:id="rId2"/>
-              </a:rPr>
-              <a:t>://www.onegeology.org/docs/technical/GeoSciML_WFS_Server_CookBook_V2_1.1.pdf</a:t>
-            </a:r>
-            <a:r>
-              <a:rPr lang="en-US" sz="2800"/>
-              <a:t> </a:t>
-            </a:r>
-            <a:endParaRPr lang="en-US" sz="2800" smtClean="0"/>
-          </a:p>
-          <a:p>
-            <a:pPr marL="0" indent="0">
-              <a:buNone/>
-            </a:pPr>
-            <a:endParaRPr lang="en-US"/>
+              <a:rPr lang="en-US" dirty="0" smtClean="0"/>
+              <a:t>Global initiative to promote web map services for geologic maps</a:t>
+            </a:r>
+          </a:p>
+          <a:p>
+            <a:r>
+              <a:rPr lang="en-US" dirty="0" smtClean="0"/>
+              <a:t>Portal and catalog hosted by French survey</a:t>
+            </a:r>
+          </a:p>
+          <a:p>
+            <a:r>
+              <a:rPr lang="en-US" dirty="0" smtClean="0"/>
+              <a:t>Simple to complex options for delivery</a:t>
+            </a:r>
+          </a:p>
+          <a:p>
+            <a:pPr lvl="1"/>
+            <a:r>
+              <a:rPr lang="en-US" dirty="0" smtClean="0"/>
+              <a:t>scanned map in WMS</a:t>
+            </a:r>
+          </a:p>
+          <a:p>
+            <a:pPr lvl="1"/>
+            <a:r>
+              <a:rPr lang="en-US" dirty="0" smtClean="0"/>
+              <a:t>WMS based on GIS data </a:t>
+            </a:r>
+          </a:p>
+          <a:p>
+            <a:pPr lvl="1"/>
+            <a:r>
+              <a:rPr lang="en-US" dirty="0" smtClean="0"/>
+              <a:t>WMS based on GIS data with standard fields</a:t>
+            </a:r>
+          </a:p>
+          <a:p>
+            <a:pPr lvl="1"/>
+            <a:r>
+              <a:rPr lang="en-US" dirty="0" smtClean="0"/>
+              <a:t>WFS using standard interchange format </a:t>
+            </a:r>
+            <a:r>
+              <a:rPr lang="en-US" sz="2400" dirty="0" smtClean="0"/>
+              <a:t>(GeoSciML)</a:t>
+            </a:r>
+            <a:endParaRPr lang="en-US" dirty="0"/>
           </a:p>
         </p:txBody>
       </p:sp>
     </p:spTree>
     <p:extLst>
       <p:ext uri="{BB962C8B-B14F-4D97-AF65-F5344CB8AC3E}">
-        <p14:creationId xmlns:p14="http://schemas.microsoft.com/office/powerpoint/2010/main" val="947486512"/>
+        <p14:creationId xmlns:p14="http://schemas.microsoft.com/office/powerpoint/2010/main" val="208089486"/>
       </p:ext>
     </p:extLst>
   </p:cSld>
@@ -5124,17 +5703,22 @@
         </p:nvSpPr>
         <p:spPr/>
         <p:txBody>
-          <a:bodyPr>
-            <a:normAutofit/>
-          </a:bodyPr>
-          <a:lstStyle/>
-          <a:p>
-            <a:pPr algn="l"/>
-            <a:r>
-              <a:rPr lang="en-US" i="1" smtClean="0"/>
-              <a:t>WMS layer name specifications</a:t>
-            </a:r>
-            <a:endParaRPr lang="en-US" i="1"/>
+          <a:bodyPr/>
+          <a:lstStyle/>
+          <a:p>
+            <a:r>
+              <a:rPr lang="en-US" dirty="0" smtClean="0"/>
+              <a:t>USGIN: </a:t>
+            </a:r>
+            <a:r>
+              <a:rPr lang="en-US" dirty="0" err="1" smtClean="0"/>
+              <a:t>OneGeologyUSA</a:t>
+            </a:r>
+            <a:r>
+              <a:rPr lang="en-US" dirty="0" smtClean="0"/>
+              <a:t> profile</a:t>
+            </a:r>
+            <a:endParaRPr lang="en-US" dirty="0"/>
           </a:p>
         </p:txBody>
       </p:sp>
@@ -5150,186 +5734,59 @@
         </p:nvSpPr>
         <p:spPr/>
         <p:txBody>
-          <a:bodyPr>
-            <a:normAutofit fontScale="70000" lnSpcReduction="20000"/>
-          </a:bodyPr>
-          <a:lstStyle/>
-          <a:p>
-            <a:pPr marL="0" indent="0">
-              <a:buNone/>
-            </a:pPr>
-            <a:r>
-              <a:rPr lang="en-US" smtClean="0"/>
-              <a:t>Layer</a:t>
-            </a:r>
-            <a:r>
-              <a:rPr lang="en-US" b="1" smtClean="0"/>
-              <a:t> </a:t>
-            </a:r>
-            <a:r>
-              <a:rPr lang="en-US" smtClean="0"/>
-              <a:t>names variable, but must adhere to specified format:</a:t>
-            </a:r>
-          </a:p>
-          <a:p>
-            <a:pPr marL="514350" indent="-514350">
-              <a:buFont typeface="+mj-lt"/>
-              <a:buAutoNum type="arabicPeriod"/>
-            </a:pPr>
-            <a:r>
-              <a:rPr lang="en-US" smtClean="0"/>
-              <a:t>Geographic extent, </a:t>
-            </a:r>
-            <a:r>
-              <a:rPr lang="en-US" i="1" smtClean="0"/>
-              <a:t>Example:  </a:t>
-            </a:r>
-            <a:r>
-              <a:rPr lang="en-US" smtClean="0"/>
-              <a:t>US</a:t>
-            </a:r>
-          </a:p>
-          <a:p>
-            <a:pPr marL="514350" indent="-514350">
-              <a:buFont typeface="+mj-lt"/>
-              <a:buAutoNum type="arabicPeriod"/>
-            </a:pPr>
-            <a:r>
-              <a:rPr lang="en-US"/>
-              <a:t>Data Owner Organization Code, </a:t>
-            </a:r>
-            <a:r>
-              <a:rPr lang="en-US" i="1"/>
-              <a:t>Example: </a:t>
-            </a:r>
-            <a:r>
-              <a:rPr lang="en-US"/>
-              <a:t>IL</a:t>
-            </a:r>
-          </a:p>
-          <a:p>
-            <a:pPr marL="514350" indent="-514350">
-              <a:buFont typeface="+mj-lt"/>
-              <a:buAutoNum type="arabicPeriod"/>
-            </a:pPr>
-            <a:r>
-              <a:rPr lang="en-US"/>
-              <a:t>Language Code, if name language differs from data </a:t>
-            </a:r>
-            <a:r>
-              <a:rPr lang="en-US" smtClean="0"/>
-              <a:t>language</a:t>
-            </a:r>
-          </a:p>
-          <a:p>
-            <a:pPr marL="514350" indent="-514350">
-              <a:buFont typeface="+mj-lt"/>
-              <a:buAutoNum type="arabicPeriod"/>
-            </a:pPr>
-            <a:r>
-              <a:rPr lang="en-US" smtClean="0"/>
-              <a:t>Scale, </a:t>
-            </a:r>
-            <a:r>
-              <a:rPr lang="en-US" i="1" smtClean="0"/>
-              <a:t>Example: </a:t>
-            </a:r>
-            <a:r>
-              <a:rPr lang="en-US" smtClean="0"/>
-              <a:t>1:1M  or 1:625k</a:t>
-            </a:r>
-          </a:p>
-          <a:p>
-            <a:pPr marL="514350" indent="-514350">
-              <a:buFont typeface="+mj-lt"/>
-              <a:buAutoNum type="arabicPeriod"/>
-            </a:pPr>
-            <a:r>
-              <a:rPr lang="en-US" smtClean="0"/>
-              <a:t>Theme, </a:t>
-            </a:r>
-            <a:r>
-              <a:rPr lang="en-US" i="1" smtClean="0"/>
-              <a:t>Example: </a:t>
-            </a:r>
-            <a:r>
-              <a:rPr lang="en-US" smtClean="0"/>
-              <a:t>Bedrock Age  or  </a:t>
-            </a:r>
-          </a:p>
-          <a:p>
-            <a:pPr marL="0" indent="0">
-              <a:buNone/>
-            </a:pPr>
-            <a:r>
-              <a:rPr lang="en-US" smtClean="0"/>
-              <a:t>			   Surficial Lithology</a:t>
-            </a:r>
-          </a:p>
-          <a:p>
-            <a:pPr marL="0" indent="0">
-              <a:buNone/>
-            </a:pPr>
-            <a:endParaRPr lang="en-US" i="1" smtClean="0"/>
-          </a:p>
-          <a:p>
-            <a:pPr marL="0" indent="0">
-              <a:buNone/>
-            </a:pPr>
-            <a:r>
-              <a:rPr lang="en-US" i="1" smtClean="0"/>
-              <a:t>Example: </a:t>
-            </a:r>
-            <a:r>
-              <a:rPr lang="en-US" smtClean="0"/>
-              <a:t> 	US-IL 1:1M Bedrock Age</a:t>
-            </a:r>
-          </a:p>
-          <a:p>
-            <a:pPr marL="0" indent="0">
-              <a:buNone/>
-            </a:pPr>
-            <a:r>
-              <a:rPr lang="en-US" i="1"/>
-              <a:t>	</a:t>
-            </a:r>
-            <a:r>
-              <a:rPr lang="en-US" i="1" smtClean="0"/>
-              <a:t>	</a:t>
-            </a:r>
-            <a:r>
-              <a:rPr lang="en-US" smtClean="0"/>
-              <a:t>US-IL 1:1M Surficial Lithology</a:t>
-            </a:r>
-            <a:endParaRPr lang="en-US" i="1" smtClean="0"/>
-          </a:p>
-          <a:p>
-            <a:pPr marL="457200" lvl="1" indent="0">
-              <a:buNone/>
-            </a:pPr>
-            <a:endParaRPr lang="en-US"/>
-          </a:p>
-          <a:p>
-            <a:pPr marL="57150" indent="0">
-              <a:buNone/>
-            </a:pPr>
-            <a:r>
-              <a:rPr lang="en-US" sz="2900" smtClean="0">
+          <a:bodyPr/>
+          <a:lstStyle/>
+          <a:p>
+            <a:r>
+              <a:rPr lang="en-US" dirty="0" smtClean="0"/>
+              <a:t>WMS based on GIS data with age and lithology fields using standard vocabulary</a:t>
+            </a:r>
+          </a:p>
+          <a:p>
+            <a:pPr lvl="1"/>
+            <a:r>
+              <a:rPr lang="en-US" dirty="0" smtClean="0"/>
+              <a:t>Must meet registration requirement for </a:t>
+            </a:r>
+            <a:r>
+              <a:rPr lang="en-US" dirty="0"/>
+              <a:t>OneGeology </a:t>
+            </a:r>
+            <a:r>
+              <a:rPr lang="en-US" sz="1400" dirty="0"/>
+              <a:t>(see </a:t>
+            </a:r>
+            <a:r>
+              <a:rPr lang="en-US" sz="1400" dirty="0">
                 <a:hlinkClick r:id="rId2"/>
               </a:rPr>
-              <a:t>http://www.onegeology.com/wmsCookbook/2_5_1.html</a:t>
-            </a:r>
-            <a:r>
-              <a:rPr lang="en-US" sz="2900" smtClean="0"/>
-              <a:t> </a:t>
-            </a:r>
+              <a:t>http://www.onegeology.org/technical_progress/technical.html</a:t>
+            </a:r>
+            <a:r>
+              <a:rPr lang="en-US" sz="1400" dirty="0"/>
+              <a:t>)</a:t>
+            </a:r>
+            <a:endParaRPr lang="en-US" sz="1400" dirty="0" smtClean="0"/>
+          </a:p>
+          <a:p>
+            <a:r>
+              <a:rPr lang="en-US" dirty="0" smtClean="0"/>
+              <a:t>WFS offering GeoSciML-Portrayal features, using standard vocabulary</a:t>
+            </a:r>
+          </a:p>
+          <a:p>
+            <a:r>
+              <a:rPr lang="en-US" dirty="0" smtClean="0"/>
+              <a:t>This should enable a ‘4-star’ accreditation for OneGeology registration</a:t>
+            </a:r>
+            <a:endParaRPr lang="en-US" dirty="0"/>
           </a:p>
         </p:txBody>
       </p:sp>
     </p:spTree>
     <p:extLst>
       <p:ext uri="{BB962C8B-B14F-4D97-AF65-F5344CB8AC3E}">
-        <p14:creationId xmlns:p14="http://schemas.microsoft.com/office/powerpoint/2010/main" val="956467992"/>
+        <p14:creationId xmlns:p14="http://schemas.microsoft.com/office/powerpoint/2010/main" val="2030114520"/>
       </p:ext>
     </p:extLst>
   </p:cSld>
@@ -5366,15 +5823,22 @@
             <p:ph type="title"/>
           </p:nvPr>
         </p:nvSpPr>
-        <p:spPr/>
-        <p:txBody>
-          <a:bodyPr/>
+        <p:spPr>
+          <a:xfrm>
+            <a:off x="381000" y="228600"/>
+            <a:ext cx="8458200" cy="1143000"/>
+          </a:xfrm>
+        </p:spPr>
+        <p:txBody>
+          <a:bodyPr>
+            <a:normAutofit/>
+          </a:bodyPr>
           <a:lstStyle/>
           <a:p>
             <a:pPr algn="l"/>
             <a:r>
               <a:rPr lang="en-US" i="1" smtClean="0"/>
-              <a:t>WFS layer name specifications</a:t>
+              <a:t>WMS service name specifications</a:t>
             </a:r>
             <a:endParaRPr lang="en-US" i="1"/>
           </a:p>
@@ -5392,50 +5856,235 @@
         </p:nvSpPr>
         <p:spPr/>
         <p:txBody>
-          <a:bodyPr/>
+          <a:bodyPr>
+            <a:normAutofit fontScale="70000" lnSpcReduction="20000"/>
+          </a:bodyPr>
           <a:lstStyle/>
           <a:p>
             <a:pPr marL="0" indent="0">
               <a:buNone/>
             </a:pPr>
             <a:r>
-              <a:rPr lang="en-US" smtClean="0"/>
-              <a:t>When using the GeoSciML_Portrayal, layer names are specified by the schema</a:t>
-            </a:r>
-          </a:p>
-          <a:p>
-            <a:pPr lvl="1"/>
-            <a:r>
-              <a:rPr lang="en-US" smtClean="0"/>
-              <a:t>GeologicUnitView</a:t>
-            </a:r>
-          </a:p>
-          <a:p>
-            <a:pPr lvl="1"/>
-            <a:r>
-              <a:rPr lang="en-US" smtClean="0"/>
-              <a:t>ContactView</a:t>
-            </a:r>
-          </a:p>
-          <a:p>
-            <a:pPr lvl="1"/>
-            <a:r>
-              <a:rPr lang="en-US" smtClean="0"/>
-              <a:t>ShearDisplacementView</a:t>
+              <a:rPr lang="en-US"/>
+              <a:t>Layer</a:t>
+            </a:r>
+            <a:r>
+              <a:rPr lang="en-US" b="1"/>
+              <a:t> </a:t>
+            </a:r>
+            <a:r>
+              <a:rPr lang="en-US"/>
+              <a:t>names variable, but must adhere to specified </a:t>
+            </a:r>
+            <a:r>
+              <a:rPr lang="en-US" smtClean="0"/>
+              <a:t>format:</a:t>
+            </a:r>
+            <a:endParaRPr lang="en-US"/>
+          </a:p>
+          <a:p>
+            <a:pPr marL="514350" indent="-514350">
+              <a:buFont typeface="+mj-lt"/>
+              <a:buAutoNum type="arabicPeriod"/>
+            </a:pPr>
+            <a:r>
+              <a:rPr lang="en-US"/>
+              <a:t>Geographic E</a:t>
+            </a:r>
+            <a:r>
+              <a:rPr lang="en-US" smtClean="0"/>
+              <a:t>xtent, </a:t>
+            </a:r>
+            <a:r>
+              <a:rPr lang="en-US" i="1"/>
+              <a:t>Example:  </a:t>
+            </a:r>
+            <a:r>
+              <a:rPr lang="en-US" smtClean="0"/>
+              <a:t>US-</a:t>
+            </a:r>
+          </a:p>
+          <a:p>
+            <a:pPr marL="514350" indent="-514350">
+              <a:buFont typeface="+mj-lt"/>
+              <a:buAutoNum type="arabicPeriod"/>
+            </a:pPr>
+            <a:r>
+              <a:rPr lang="en-US" smtClean="0"/>
+              <a:t>Data Owner Organization Code, </a:t>
+            </a:r>
+            <a:r>
+              <a:rPr lang="en-US" i="1" smtClean="0"/>
+              <a:t>Example: </a:t>
+            </a:r>
+            <a:r>
+              <a:rPr lang="en-US" smtClean="0"/>
+              <a:t>IL</a:t>
+            </a:r>
+          </a:p>
+          <a:p>
+            <a:pPr marL="514350" indent="-514350">
+              <a:buFont typeface="+mj-lt"/>
+              <a:buAutoNum type="arabicPeriod"/>
+            </a:pPr>
+            <a:r>
+              <a:rPr lang="en-US" smtClean="0"/>
+              <a:t>Language Code, if name language differs from data language</a:t>
+            </a:r>
+            <a:endParaRPr lang="en-US"/>
+          </a:p>
+          <a:p>
+            <a:pPr marL="514350" indent="-514350">
+              <a:buFont typeface="+mj-lt"/>
+              <a:buAutoNum type="arabicPeriod"/>
+            </a:pPr>
+            <a:r>
+              <a:rPr lang="en-US" smtClean="0"/>
+              <a:t>Theme</a:t>
+            </a:r>
+            <a:r>
+              <a:rPr lang="en-US"/>
+              <a:t>, </a:t>
+            </a:r>
+            <a:r>
+              <a:rPr lang="en-US" i="1"/>
+              <a:t>Example: </a:t>
+            </a:r>
+            <a:r>
+              <a:rPr lang="en-US"/>
+              <a:t>Bedrock Age  or  </a:t>
             </a:r>
           </a:p>
           <a:p>
             <a:pPr marL="0" indent="0">
               <a:buNone/>
             </a:pPr>
-            <a:endParaRPr lang="en-US"/>
+            <a:r>
+              <a:rPr lang="en-US"/>
+              <a:t>	</a:t>
+            </a:r>
+            <a:r>
+              <a:rPr lang="en-US" smtClean="0"/>
+              <a:t>	           Surficial </a:t>
+            </a:r>
+            <a:r>
+              <a:rPr lang="en-US"/>
+              <a:t>Lithology</a:t>
+            </a:r>
+          </a:p>
+          <a:p>
+            <a:pPr marL="0" indent="0">
+              <a:buNone/>
+            </a:pPr>
+            <a:endParaRPr lang="en-US" i="1"/>
+          </a:p>
+          <a:p>
+            <a:pPr marL="0" indent="0">
+              <a:buNone/>
+            </a:pPr>
+            <a:r>
+              <a:rPr lang="en-US" i="1" smtClean="0"/>
+              <a:t>Service Name Example</a:t>
+            </a:r>
+            <a:r>
+              <a:rPr lang="en-US" i="1"/>
+              <a:t>: </a:t>
+            </a:r>
+            <a:r>
+              <a:rPr lang="en-US"/>
+              <a:t> </a:t>
+            </a:r>
+            <a:r>
+              <a:rPr lang="en-US" smtClean="0"/>
+              <a:t>US-IL </a:t>
+            </a:r>
+            <a:r>
+              <a:rPr lang="en-US"/>
+              <a:t>Bedrock Age</a:t>
+            </a:r>
+          </a:p>
+          <a:p>
+            <a:pPr marL="0" indent="0">
+              <a:buNone/>
+            </a:pPr>
+            <a:r>
+              <a:rPr lang="en-US" i="1"/>
+              <a:t>		</a:t>
+            </a:r>
+            <a:r>
+              <a:rPr lang="en-US" i="1" smtClean="0"/>
+              <a:t>	</a:t>
+            </a:r>
+            <a:r>
+              <a:rPr lang="en-US" smtClean="0"/>
+              <a:t>US-IL Surficial </a:t>
+            </a:r>
+            <a:r>
+              <a:rPr lang="en-US"/>
+              <a:t>Lithology</a:t>
+            </a:r>
+            <a:endParaRPr lang="en-US" i="1"/>
+          </a:p>
+          <a:p>
+            <a:pPr marL="0" lvl="1" indent="0">
+              <a:buNone/>
+            </a:pPr>
+            <a:endParaRPr lang="en-US" sz="900" smtClean="0"/>
+          </a:p>
+          <a:p>
+            <a:pPr marL="0" lvl="1" indent="0">
+              <a:buNone/>
+            </a:pPr>
+            <a:endParaRPr lang="en-US" smtClean="0"/>
+          </a:p>
+          <a:p>
+            <a:pPr marL="0" lvl="1" indent="0">
+              <a:buNone/>
+            </a:pPr>
+            <a:r>
+              <a:rPr lang="en-US" i="1" smtClean="0"/>
+              <a:t>Service URL Example:  </a:t>
+            </a:r>
+            <a:r>
+              <a:rPr lang="en-US" smtClean="0"/>
+              <a:t>US-IL_Bedrock_Geology</a:t>
+            </a:r>
+          </a:p>
+          <a:p>
+            <a:pPr marL="0" lvl="1" indent="0">
+              <a:buNone/>
+            </a:pPr>
+            <a:endParaRPr lang="en-US" smtClean="0">
+              <a:hlinkClick r:id="rId2"/>
+            </a:endParaRPr>
+          </a:p>
+          <a:p>
+            <a:pPr marL="0" lvl="1" indent="0">
+              <a:buNone/>
+            </a:pPr>
+            <a:r>
+              <a:rPr lang="en-US" smtClean="0">
+                <a:hlinkClick r:id="rId2"/>
+              </a:rPr>
+              <a:t>http://www.onegeology.com/wmsCookbook/2_2.html</a:t>
+            </a:r>
+            <a:r>
+              <a:rPr lang="en-US" smtClean="0"/>
+              <a:t> </a:t>
+            </a:r>
+          </a:p>
+          <a:p>
+            <a:pPr marL="0" indent="0">
+              <a:buNone/>
+            </a:pPr>
+            <a:endParaRPr lang="en-US" b="1"/>
           </a:p>
         </p:txBody>
       </p:sp>
     </p:spTree>
     <p:extLst>
       <p:ext uri="{BB962C8B-B14F-4D97-AF65-F5344CB8AC3E}">
-        <p14:creationId xmlns:p14="http://schemas.microsoft.com/office/powerpoint/2010/main" val="192563953"/>
+        <p14:creationId xmlns:p14="http://schemas.microsoft.com/office/powerpoint/2010/main" val="1042319510"/>
       </p:ext>
     </p:extLst>
   </p:cSld>
@@ -5480,7 +6129,7 @@
             <a:pPr algn="l"/>
             <a:r>
               <a:rPr lang="en-US" i="1" smtClean="0"/>
-              <a:t>Access GeoSciML-Portrayal schema</a:t>
+              <a:t>WFS service name specifications</a:t>
             </a:r>
             <a:endParaRPr lang="en-US" i="1"/>
           </a:p>
@@ -5503,73 +6152,86 @@
           </a:bodyPr>
           <a:lstStyle/>
           <a:p>
+            <a:r>
+              <a:rPr lang="en-US" smtClean="0"/>
+              <a:t>Service naming conventions for WFS are specified only in so far that they closely resemble the accompanying WMS</a:t>
+            </a:r>
+          </a:p>
+          <a:p>
             <a:pPr marL="0" indent="0">
               <a:buNone/>
             </a:pPr>
-            <a:r>
-              <a:rPr lang="en-US" smtClean="0">
+            <a:endParaRPr lang="en-US" sz="800" smtClean="0"/>
+          </a:p>
+          <a:p>
+            <a:r>
+              <a:rPr lang="en-US" smtClean="0"/>
+              <a:t>For clarity, good practice might be:</a:t>
+            </a:r>
+          </a:p>
+          <a:p>
+            <a:pPr marL="0" indent="0">
+              <a:buNone/>
+            </a:pPr>
+            <a:endParaRPr lang="en-US" sz="1400" smtClean="0"/>
+          </a:p>
+          <a:p>
+            <a:pPr marL="0" indent="0">
+              <a:buNone/>
+            </a:pPr>
+            <a:r>
+              <a:rPr lang="en-US" smtClean="0"/>
+              <a:t>Same as WMS, only affixed with “_WFS”</a:t>
+            </a:r>
+          </a:p>
+          <a:p>
+            <a:pPr marL="0" indent="0">
+              <a:buNone/>
+            </a:pPr>
+            <a:endParaRPr lang="en-US" sz="1400"/>
+          </a:p>
+          <a:p>
+            <a:pPr marL="0" lvl="1" indent="0">
+              <a:buNone/>
+            </a:pPr>
+            <a:r>
+              <a:rPr lang="en-US" i="1" smtClean="0"/>
+              <a:t>Service URL Example:  </a:t>
+            </a:r>
+            <a:r>
+              <a:rPr lang="en-US" smtClean="0"/>
+              <a:t>US-IL_Bedrock_Geology_WFS</a:t>
+            </a:r>
+          </a:p>
+          <a:p>
+            <a:pPr marL="0" indent="0">
+              <a:buNone/>
+            </a:pPr>
+            <a:endParaRPr lang="en-US" u="sng" smtClean="0">
+              <a:hlinkClick r:id="rId2"/>
+            </a:endParaRPr>
+          </a:p>
+          <a:p>
+            <a:pPr marL="0" indent="0">
+              <a:buNone/>
+            </a:pPr>
+            <a:r>
+              <a:rPr lang="en-US" sz="2800" u="sng" smtClean="0">
                 <a:hlinkClick r:id="rId2"/>
               </a:rPr>
-              <a:t>https://github.com/usgin-models/GeoSciML-Portrayal</a:t>
-            </a:r>
-            <a:endParaRPr lang="en-US" smtClean="0"/>
-          </a:p>
-          <a:p>
-            <a:pPr marL="0" indent="0">
-              <a:buNone/>
-            </a:pPr>
-            <a:endParaRPr lang="en-US"/>
-          </a:p>
-          <a:p>
-            <a:pPr marL="0" indent="0">
-              <a:buNone/>
-            </a:pPr>
-            <a:endParaRPr lang="en-US" smtClean="0"/>
-          </a:p>
-          <a:p>
-            <a:pPr marL="0" indent="0">
-              <a:buNone/>
-            </a:pPr>
-            <a:r>
-              <a:rPr lang="en-US" smtClean="0">
-                <a:hlinkClick r:id="rId3"/>
+              <a:t>http</a:t>
+            </a:r>
+            <a:r>
+              <a:rPr lang="en-US" sz="2800" u="sng">
+                <a:hlinkClick r:id="rId2"/>
               </a:rPr>
-              <a:t>http://schemas.usgin.org/models/#geosciml-portrayal-units</a:t>
-            </a:r>
-            <a:endParaRPr lang="en-US" smtClean="0"/>
-          </a:p>
-          <a:p>
-            <a:pPr marL="0" indent="0">
-              <a:buNone/>
-            </a:pPr>
-            <a:r>
-              <a:rPr lang="en-US" smtClean="0">
-                <a:hlinkClick r:id="rId4"/>
-              </a:rPr>
-              <a:t>http://schemas.usgin.org/models/#geosciml-portrayal-contacts</a:t>
-            </a:r>
-            <a:endParaRPr lang="en-US" smtClean="0"/>
-          </a:p>
-          <a:p>
-            <a:pPr marL="0" indent="0">
-              <a:buNone/>
-            </a:pPr>
-            <a:r>
-              <a:rPr lang="en-US" smtClean="0">
-                <a:hlinkClick r:id="rId5"/>
-              </a:rPr>
-              <a:t>http://schemas.usgin.org/models/#geosciml-portrayal-faults</a:t>
-            </a:r>
-            <a:r>
-              <a:rPr lang="en-US" smtClean="0"/>
+              <a:t>://www.onegeology.org/docs/technical/GeoSciML_WFS_Server_CookBook_V2_1.1.pdf</a:t>
+            </a:r>
+            <a:r>
+              <a:rPr lang="en-US" sz="2800"/>
               <a:t> </a:t>
             </a:r>
-          </a:p>
-          <a:p>
-            <a:pPr marL="0" indent="0">
-              <a:buNone/>
-            </a:pPr>
-            <a:endParaRPr lang="en-US" smtClean="0"/>
+            <a:endParaRPr lang="en-US" sz="2800" smtClean="0"/>
           </a:p>
           <a:p>
             <a:pPr marL="0" indent="0">
@@ -5582,7 +6244,7 @@
     </p:spTree>
     <p:extLst>
       <p:ext uri="{BB962C8B-B14F-4D97-AF65-F5344CB8AC3E}">
-        <p14:creationId xmlns:p14="http://schemas.microsoft.com/office/powerpoint/2010/main" val="3449606523"/>
+        <p14:creationId xmlns:p14="http://schemas.microsoft.com/office/powerpoint/2010/main" val="947486512"/>
       </p:ext>
     </p:extLst>
   </p:cSld>
@@ -5621,13 +6283,15 @@
         </p:nvSpPr>
         <p:spPr/>
         <p:txBody>
-          <a:bodyPr/>
+          <a:bodyPr>
+            <a:normAutofit/>
+          </a:bodyPr>
           <a:lstStyle/>
           <a:p>
             <a:pPr algn="l"/>
             <a:r>
               <a:rPr lang="en-US" i="1" smtClean="0"/>
-              <a:t>Important Bits</a:t>
+              <a:t>WMS layer name specifications</a:t>
             </a:r>
             <a:endParaRPr lang="en-US" i="1"/>
           </a:p>
@@ -5645,75 +6309,186 @@
         </p:nvSpPr>
         <p:spPr/>
         <p:txBody>
-          <a:bodyPr/>
-          <a:lstStyle/>
-          <a:p>
-            <a:r>
-              <a:rPr lang="en-US" smtClean="0"/>
-              <a:t>Required Namespace: </a:t>
-            </a:r>
-            <a:r>
-              <a:rPr lang="en-US" sz="2800" smtClean="0">
+          <a:bodyPr>
+            <a:normAutofit fontScale="70000" lnSpcReduction="20000"/>
+          </a:bodyPr>
+          <a:lstStyle/>
+          <a:p>
+            <a:pPr marL="0" indent="0">
+              <a:buNone/>
+            </a:pPr>
+            <a:r>
+              <a:rPr lang="en-US" smtClean="0"/>
+              <a:t>Layer</a:t>
+            </a:r>
+            <a:r>
+              <a:rPr lang="en-US" b="1" smtClean="0"/>
+              <a:t> </a:t>
+            </a:r>
+            <a:r>
+              <a:rPr lang="en-US" smtClean="0"/>
+              <a:t>names variable, but must adhere to specified format:</a:t>
+            </a:r>
+          </a:p>
+          <a:p>
+            <a:pPr marL="514350" indent="-514350">
+              <a:buFont typeface="+mj-lt"/>
+              <a:buAutoNum type="arabicPeriod"/>
+            </a:pPr>
+            <a:r>
+              <a:rPr lang="en-US" smtClean="0"/>
+              <a:t>Geographic extent, </a:t>
+            </a:r>
+            <a:r>
+              <a:rPr lang="en-US" i="1" smtClean="0"/>
+              <a:t>Example:  </a:t>
+            </a:r>
+            <a:r>
+              <a:rPr lang="en-US" smtClean="0"/>
+              <a:t>US</a:t>
+            </a:r>
+          </a:p>
+          <a:p>
+            <a:pPr marL="514350" indent="-514350">
+              <a:buFont typeface="+mj-lt"/>
+              <a:buAutoNum type="arabicPeriod"/>
+            </a:pPr>
+            <a:r>
+              <a:rPr lang="en-US"/>
+              <a:t>Data Owner Organization Code, </a:t>
+            </a:r>
+            <a:r>
+              <a:rPr lang="en-US" i="1"/>
+              <a:t>Example: </a:t>
+            </a:r>
+            <a:r>
+              <a:rPr lang="en-US"/>
+              <a:t>IL</a:t>
+            </a:r>
+          </a:p>
+          <a:p>
+            <a:pPr marL="514350" indent="-514350">
+              <a:buFont typeface="+mj-lt"/>
+              <a:buAutoNum type="arabicPeriod"/>
+            </a:pPr>
+            <a:r>
+              <a:rPr lang="en-US"/>
+              <a:t>Language Code, if name language differs from data </a:t>
+            </a:r>
+            <a:r>
+              <a:rPr lang="en-US" smtClean="0"/>
+              <a:t>language</a:t>
+            </a:r>
+          </a:p>
+          <a:p>
+            <a:pPr marL="514350" indent="-514350">
+              <a:buFont typeface="+mj-lt"/>
+              <a:buAutoNum type="arabicPeriod"/>
+            </a:pPr>
+            <a:r>
+              <a:rPr lang="en-US" smtClean="0"/>
+              <a:t>Scale, </a:t>
+            </a:r>
+            <a:r>
+              <a:rPr lang="en-US" i="1" smtClean="0"/>
+              <a:t>Example: </a:t>
+            </a:r>
+            <a:r>
+              <a:rPr lang="en-US" smtClean="0"/>
+              <a:t>1:1M  or 1:625k</a:t>
+            </a:r>
+          </a:p>
+          <a:p>
+            <a:pPr marL="514350" indent="-514350">
+              <a:buFont typeface="+mj-lt"/>
+              <a:buAutoNum type="arabicPeriod"/>
+            </a:pPr>
+            <a:r>
+              <a:rPr lang="en-US" smtClean="0"/>
+              <a:t>Theme, </a:t>
+            </a:r>
+            <a:r>
+              <a:rPr lang="en-US" i="1" smtClean="0"/>
+              <a:t>Example: </a:t>
+            </a:r>
+            <a:r>
+              <a:rPr lang="en-US" smtClean="0"/>
+              <a:t>Bedrock Age  or  </a:t>
+            </a:r>
+          </a:p>
+          <a:p>
+            <a:pPr marL="0" indent="0">
+              <a:buNone/>
+            </a:pPr>
+            <a:r>
+              <a:rPr lang="en-US" smtClean="0"/>
+              <a:t>			   Surficial Lithology</a:t>
+            </a:r>
+          </a:p>
+          <a:p>
+            <a:pPr marL="0" indent="0">
+              <a:buNone/>
+            </a:pPr>
+            <a:endParaRPr lang="en-US" i="1" smtClean="0"/>
+          </a:p>
+          <a:p>
+            <a:pPr marL="0" indent="0">
+              <a:buNone/>
+            </a:pPr>
+            <a:r>
+              <a:rPr lang="en-US" i="1" smtClean="0"/>
+              <a:t>Example: </a:t>
+            </a:r>
+            <a:r>
+              <a:rPr lang="en-US" smtClean="0"/>
+              <a:t> 	US-IL 1:1M Bedrock Age</a:t>
+            </a:r>
+          </a:p>
+          <a:p>
+            <a:pPr marL="0" indent="0">
+              <a:buNone/>
+            </a:pPr>
+            <a:r>
+              <a:rPr lang="en-US" i="1"/>
+              <a:t>	</a:t>
+            </a:r>
+            <a:r>
+              <a:rPr lang="en-US" i="1" smtClean="0"/>
+              <a:t>	</a:t>
+            </a:r>
+            <a:r>
+              <a:rPr lang="en-US" smtClean="0"/>
+              <a:t>US-IL 1:1M Surficial Lithology</a:t>
+            </a:r>
+            <a:endParaRPr lang="en-US" i="1" smtClean="0"/>
+          </a:p>
+          <a:p>
+            <a:pPr marL="457200" lvl="1" indent="0">
+              <a:buNone/>
+            </a:pPr>
+            <a:endParaRPr lang="en-US"/>
+          </a:p>
+          <a:p>
+            <a:pPr marL="57150" indent="0">
+              <a:buNone/>
+            </a:pPr>
+            <a:r>
+              <a:rPr lang="en-US" sz="2900" smtClean="0">
                 <a:hlinkClick r:id="rId2"/>
               </a:rPr>
-              <a:t>http://xmlns.geosciml.org/geosciml-portrayal/2.0</a:t>
-            </a:r>
-            <a:endParaRPr lang="en-US" sz="2800" smtClean="0"/>
-          </a:p>
-          <a:p>
-            <a:r>
-              <a:rPr lang="en-US" smtClean="0"/>
-              <a:t>Required Prefix:   gsmlp   </a:t>
-            </a:r>
-          </a:p>
-          <a:p>
-            <a:r>
-              <a:rPr lang="en-US" smtClean="0"/>
-              <a:t>OBJECTID </a:t>
-            </a:r>
-            <a:r>
-              <a:rPr lang="en-US" smtClean="0"/>
-              <a:t>field – </a:t>
-            </a:r>
-            <a:r>
-              <a:rPr lang="en-US" i="1" smtClean="0"/>
-              <a:t>turn it off in MXD!</a:t>
-            </a:r>
-            <a:endParaRPr lang="en-US" i="1" smtClean="0"/>
-          </a:p>
-          <a:p>
-            <a:r>
-              <a:rPr lang="en-US" smtClean="0"/>
-              <a:t>Validate </a:t>
-            </a:r>
-            <a:r>
-              <a:rPr lang="en-US" smtClean="0"/>
-              <a:t>your WFS </a:t>
-            </a:r>
-            <a:r>
-              <a:rPr lang="en-US" smtClean="0"/>
-              <a:t>service using the USGIN tool </a:t>
-            </a:r>
-            <a:r>
-              <a:rPr lang="en-US" sz="2800" smtClean="0">
-                <a:hlinkClick r:id="rId3"/>
-              </a:rPr>
-              <a:t>http://schemas.usgin.org/validate/wfs</a:t>
-            </a:r>
-            <a:r>
-              <a:rPr lang="en-US" sz="2800" smtClean="0"/>
+              <a:t>http://www.onegeology.com/wmsCookbook/2_5_1.html</a:t>
+            </a:r>
+            <a:r>
+              <a:rPr lang="en-US" sz="2900" smtClean="0"/>
               <a:t> </a:t>
             </a:r>
-          </a:p>
-          <a:p>
-            <a:endParaRPr lang="en-US"/>
           </a:p>
         </p:txBody>
       </p:sp>
     </p:spTree>
     <p:extLst>
       <p:ext uri="{BB962C8B-B14F-4D97-AF65-F5344CB8AC3E}">
-        <p14:creationId xmlns:p14="http://schemas.microsoft.com/office/powerpoint/2010/main" val="3653546589"/>
+        <p14:creationId xmlns:p14="http://schemas.microsoft.com/office/powerpoint/2010/main" val="956467992"/>
       </p:ext>
     </p:extLst>
   </p:cSld>
@@ -5758,7 +6533,7 @@
             <a:pPr algn="l"/>
             <a:r>
               <a:rPr lang="en-US" i="1" smtClean="0"/>
-              <a:t>Layer Files and SLDs</a:t>
+              <a:t>WFS layer name specifications</a:t>
             </a:r>
             <a:endParaRPr lang="en-US" i="1"/>
           </a:p>
@@ -5776,131 +6551,50 @@
         </p:nvSpPr>
         <p:spPr/>
         <p:txBody>
-          <a:bodyPr>
-            <a:normAutofit fontScale="92500"/>
-          </a:bodyPr>
+          <a:bodyPr/>
           <a:lstStyle/>
           <a:p>
             <a:pPr marL="0" indent="0">
               <a:buNone/>
             </a:pPr>
             <a:r>
-              <a:rPr lang="en-US"/>
-              <a:t>A</a:t>
-            </a:r>
-            <a:r>
-              <a:rPr lang="en-US" smtClean="0"/>
-              <a:t>vailable at  </a:t>
+              <a:rPr lang="en-US" smtClean="0"/>
+              <a:t>When using the GeoSciML_Portrayal, layer names are specified by the schema</a:t>
+            </a:r>
+          </a:p>
+          <a:p>
+            <a:pPr lvl="1"/>
+            <a:r>
+              <a:rPr lang="en-US" smtClean="0"/>
+              <a:t>GeologicUnitView</a:t>
+            </a:r>
+          </a:p>
+          <a:p>
+            <a:pPr lvl="1"/>
+            <a:r>
+              <a:rPr lang="en-US" smtClean="0"/>
+              <a:t>ContactView</a:t>
+            </a:r>
+          </a:p>
+          <a:p>
+            <a:pPr lvl="1"/>
+            <a:r>
+              <a:rPr lang="en-US" smtClean="0"/>
+              <a:t>ShearDisplacementView</a:t>
             </a:r>
           </a:p>
           <a:p>
             <a:pPr marL="0" indent="0">
               <a:buNone/>
             </a:pPr>
-            <a:r>
-              <a:rPr lang="en-US" sz="2700" smtClean="0">
-                <a:hlinkClick r:id="rId2"/>
-              </a:rPr>
-              <a:t>https://github.com/usgin-models/GeoSciML-Portrayal/archive/master.zip</a:t>
-            </a:r>
-            <a:r>
-              <a:rPr lang="en-US" sz="2700" smtClean="0"/>
-              <a:t> </a:t>
-            </a:r>
-          </a:p>
-          <a:p>
-            <a:pPr marL="0" indent="0">
-              <a:buNone/>
-            </a:pPr>
-            <a:r>
-              <a:rPr lang="en-US" sz="2700" smtClean="0"/>
-              <a:t>Layer files: usginOneGeology/LayerFiles </a:t>
-            </a:r>
-            <a:r>
-              <a:rPr lang="en-US" sz="2700" i="1" smtClean="0">
-                <a:solidFill>
-                  <a:schemeClr val="accent2"/>
-                </a:solidFill>
-              </a:rPr>
-              <a:t>– can be used globally</a:t>
-            </a:r>
-          </a:p>
-          <a:p>
-            <a:pPr marL="0" indent="0">
-              <a:buNone/>
-            </a:pPr>
-            <a:r>
-              <a:rPr lang="en-US" sz="2700" smtClean="0"/>
-              <a:t>SLD Examples: usginOneGeology/SLD_Examples</a:t>
-            </a:r>
-          </a:p>
-          <a:p>
-            <a:pPr lvl="1"/>
-            <a:r>
-              <a:rPr lang="en-US" sz="2300" smtClean="0"/>
-              <a:t>WMS SLDs tailored for each layer (name)</a:t>
-            </a:r>
-          </a:p>
-          <a:p>
-            <a:pPr lvl="1"/>
-            <a:r>
-              <a:rPr lang="en-US" sz="2300" smtClean="0"/>
-              <a:t>WFS SLDs </a:t>
-            </a:r>
-            <a:r>
-              <a:rPr lang="en-US" sz="2300" i="1" smtClean="0">
-                <a:solidFill>
-                  <a:schemeClr val="accent2"/>
-                </a:solidFill>
-              </a:rPr>
-              <a:t>can be used globally</a:t>
-            </a:r>
-            <a:r>
-              <a:rPr lang="en-US" sz="2300" smtClean="0"/>
-              <a:t> (symbology based on representativeAge_uri )</a:t>
-            </a:r>
-            <a:endParaRPr lang="en-US" sz="2300"/>
-          </a:p>
-          <a:p>
-            <a:pPr lvl="1"/>
-            <a:r>
-              <a:rPr lang="en-US" sz="2300" smtClean="0"/>
-              <a:t>SLDs can be made in ArcMap using the Arc2Earth plug-in</a:t>
-            </a:r>
-          </a:p>
-          <a:p>
-            <a:pPr marL="457200" lvl="1" indent="0">
-              <a:buNone/>
-            </a:pPr>
-            <a:r>
-              <a:rPr lang="en-US" sz="2300" smtClean="0">
-                <a:hlinkClick r:id="rId3"/>
-              </a:rPr>
-              <a:t>http://lab.usgin.org/groups/troubleshooting-web-service-deployment-blog/how-create-styled-layer-descriptor-sld-using-arc2</a:t>
-            </a:r>
-            <a:r>
-              <a:rPr lang="en-US" sz="2300" smtClean="0"/>
-              <a:t> </a:t>
-            </a:r>
-          </a:p>
-          <a:p>
-            <a:pPr marL="0" indent="0">
-              <a:buNone/>
-            </a:pPr>
-            <a:endParaRPr lang="en-US" sz="2700"/>
-          </a:p>
-          <a:p>
-            <a:pPr marL="0" indent="0">
-              <a:buNone/>
-            </a:pPr>
-            <a:endParaRPr lang="en-US" sz="2700"/>
+            <a:endParaRPr lang="en-US"/>
           </a:p>
         </p:txBody>
       </p:sp>
     </p:spTree>
     <p:extLst>
       <p:ext uri="{BB962C8B-B14F-4D97-AF65-F5344CB8AC3E}">
-        <p14:creationId xmlns:p14="http://schemas.microsoft.com/office/powerpoint/2010/main" val="1003467880"/>
+        <p14:creationId xmlns:p14="http://schemas.microsoft.com/office/powerpoint/2010/main" val="192563953"/>
       </p:ext>
     </p:extLst>
   </p:cSld>

</xml_diff>

<commit_message>
added slide to PPT
</commit_message>
<xml_diff>
--- a/OneGeologyWebinar/OneGeology.pptx
+++ b/OneGeologyWebinar/OneGeology.pptx
@@ -22,8 +22,9 @@
     <p:sldId id="267" r:id="rId16"/>
     <p:sldId id="268" r:id="rId17"/>
     <p:sldId id="271" r:id="rId18"/>
-    <p:sldId id="270" r:id="rId19"/>
-    <p:sldId id="257" r:id="rId20"/>
+    <p:sldId id="277" r:id="rId19"/>
+    <p:sldId id="270" r:id="rId20"/>
+    <p:sldId id="257" r:id="rId21"/>
   </p:sldIdLst>
   <p:sldSz cx="9144000" cy="6858000" type="screen4x3"/>
   <p:notesSz cx="6858000" cy="9144000"/>
@@ -3313,8 +3314,8 @@
           <a:lstStyle/>
           <a:p>
             <a:r>
-              <a:rPr lang="en-US" dirty="0" smtClean="0"/>
-              <a:t>GeoSciML portrayal</a:t>
+              <a:rPr lang="en-US" smtClean="0"/>
+              <a:t>GeoSciML Portrayal</a:t>
             </a:r>
             <a:endParaRPr lang="en-US" dirty="0"/>
           </a:p>
@@ -3637,13 +3638,7 @@
               <a:rPr lang="en-US" sz="2400">
                 <a:hlinkClick r:id="rId2"/>
               </a:rPr>
-              <a:t>http://</a:t>
-            </a:r>
-            <a:r>
-              <a:rPr lang="en-US" sz="2400">
-                <a:hlinkClick r:id="rId2"/>
-              </a:rPr>
-              <a:t>resource.geosciml.org/static/vocabulary/cgi/201211</a:t>
+              <a:t>http://resource.geosciml.org/static/vocabulary/cgi/201211</a:t>
             </a:r>
             <a:r>
               <a:rPr lang="en-US" sz="2400" smtClean="0">
@@ -3847,15 +3842,7 @@
             <a:pPr lvl="1"/>
             <a:r>
               <a:rPr lang="en-US" sz="2300" smtClean="0"/>
-              <a:t>WMS SLDs tailored for each layer </a:t>
-            </a:r>
-            <a:r>
-              <a:rPr lang="en-US" sz="2300" smtClean="0"/>
-              <a:t>(by layer name</a:t>
-            </a:r>
-            <a:r>
-              <a:rPr lang="en-US" sz="2300" smtClean="0"/>
-              <a:t>)</a:t>
+              <a:t>WMS SLDs tailored for each layer (by layer name)</a:t>
             </a:r>
           </a:p>
           <a:p>
@@ -3870,15 +3857,7 @@
                   <a:schemeClr val="accent2"/>
                 </a:solidFill>
               </a:rPr>
-              <a:t>can be used </a:t>
-            </a:r>
-            <a:r>
-              <a:rPr lang="en-US" sz="2300" i="1" smtClean="0">
-                <a:solidFill>
-                  <a:schemeClr val="accent2"/>
-                </a:solidFill>
-              </a:rPr>
-              <a:t>globally</a:t>
+              <a:t>can be used globally</a:t>
             </a:r>
             <a:endParaRPr lang="en-US" sz="2300"/>
           </a:p>
@@ -4092,8 +4071,17 @@
             </a:r>
             <a:r>
               <a:rPr lang="en-US" i="1" smtClean="0"/>
-              <a:t>oneGeology WMS CC</a:t>
-            </a:r>
+              <a:t>oneGeology </a:t>
+            </a:r>
+            <a:r>
+              <a:rPr lang="en-US" i="1" smtClean="0"/>
+              <a:t>WMS</a:t>
+            </a:r>
+          </a:p>
+          <a:p>
+            <a:pPr marL="0" indent="0">
+              <a:buNone/>
+            </a:pPr>
             <a:endParaRPr lang="en-US" dirty="0" smtClean="0"/>
           </a:p>
           <a:p>
@@ -4967,11 +4955,7 @@
             <a:pPr algn="l"/>
             <a:r>
               <a:rPr lang="en-US" i="1" smtClean="0"/>
-              <a:t>Enable Custom </a:t>
-            </a:r>
-            <a:r>
-              <a:rPr lang="en-US" i="1"/>
-              <a:t>Capabilities</a:t>
+              <a:t>Check service endpoints in CC</a:t>
             </a:r>
             <a:endParaRPr lang="en-US"/>
           </a:p>
@@ -4994,121 +4978,57 @@
           </a:bodyPr>
           <a:lstStyle/>
           <a:p>
-            <a:pPr lvl="0"/>
+            <a:pPr marL="0" indent="0">
+              <a:buNone/>
+            </a:pPr>
+            <a:r>
+              <a:rPr lang="en-US" sz="3000" smtClean="0"/>
+              <a:t>Ensure that service endpoint in CC “OnlineResource” points to externally facing server</a:t>
+            </a:r>
+          </a:p>
+          <a:p>
+            <a:pPr marL="0" indent="0">
+              <a:buNone/>
+            </a:pPr>
+            <a:endParaRPr lang="en-US" sz="2800" smtClean="0"/>
+          </a:p>
+          <a:p>
+            <a:pPr marL="0" indent="0">
+              <a:buNone/>
+            </a:pPr>
+            <a:r>
+              <a:rPr lang="en-US" sz="2800" smtClean="0"/>
+              <a:t>&lt;</a:t>
+            </a:r>
             <a:r>
               <a:rPr lang="en-US" sz="2800"/>
-              <a:t>Stop the service in ArcServer or ArcServer </a:t>
-            </a:r>
-            <a:r>
-              <a:rPr lang="en-US" sz="2800" smtClean="0"/>
-              <a:t>Manager</a:t>
-            </a:r>
-            <a:endParaRPr lang="en-US" sz="2800"/>
-          </a:p>
-          <a:p>
-            <a:pPr lvl="0"/>
-            <a:r>
-              <a:rPr lang="en-US" sz="2800" smtClean="0"/>
-              <a:t>Right-click </a:t>
+              <a:t>OnlineResource xmlns:xlink="http://www.w3.org/1999/xlink" xlink:type="simple" xlink:href="</a:t>
+            </a:r>
+            <a:r>
+              <a:rPr lang="en-US" sz="2800">
+                <a:effectLst>
+                  <a:glow rad="228600">
+                    <a:schemeClr val="accent6">
+                      <a:satMod val="175000"/>
+                      <a:alpha val="40000"/>
+                    </a:schemeClr>
+                  </a:glow>
+                </a:effectLst>
+              </a:rPr>
+              <a:t>http://services.azgs.az.gov</a:t>
             </a:r>
             <a:r>
               <a:rPr lang="en-US" sz="2800"/>
-              <a:t>on the service and select </a:t>
-            </a:r>
-          </a:p>
-          <a:p>
-            <a:pPr marL="0" lvl="0" indent="0">
-              <a:buNone/>
-            </a:pPr>
-            <a:r>
-              <a:rPr lang="en-US" sz="2800" i="1" smtClean="0"/>
-              <a:t>Service Properties </a:t>
-            </a:r>
-            <a:endParaRPr lang="en-US" sz="2800" i="1"/>
-          </a:p>
-          <a:p>
-            <a:pPr lvl="0"/>
-            <a:r>
-              <a:rPr lang="en-US" sz="2800"/>
-              <a:t>Navigate to the </a:t>
-            </a:r>
-            <a:r>
-              <a:rPr lang="en-US" sz="2800" i="1"/>
-              <a:t>Capabilities</a:t>
-            </a:r>
-            <a:r>
-              <a:rPr lang="en-US" sz="2800"/>
-              <a:t> tab and select </a:t>
-            </a:r>
-            <a:r>
-              <a:rPr lang="en-US" sz="2800" i="1" smtClean="0"/>
-              <a:t>WMS</a:t>
-            </a:r>
-            <a:r>
-              <a:rPr lang="en-US" sz="2800" smtClean="0"/>
-              <a:t> </a:t>
-            </a:r>
-            <a:endParaRPr lang="en-US" sz="2800"/>
-          </a:p>
-          <a:p>
-            <a:pPr lvl="0"/>
-            <a:r>
-              <a:rPr lang="en-US" sz="2800"/>
-              <a:t>Select </a:t>
-            </a:r>
-            <a:r>
-              <a:rPr lang="en-US" sz="2800" i="1"/>
-              <a:t>Use External Capabilities files</a:t>
-            </a:r>
-            <a:r>
-              <a:rPr lang="en-US" sz="2800"/>
-              <a:t>. Specify the location and prefix, for example:</a:t>
-            </a:r>
-          </a:p>
-          <a:p>
-            <a:pPr marL="0" indent="0">
-              <a:buNone/>
-            </a:pPr>
-            <a:r>
-              <a:rPr lang="en-US" sz="2800">
-                <a:solidFill>
-                  <a:schemeClr val="tx2"/>
-                </a:solidFill>
-              </a:rPr>
-              <a:t>http://</a:t>
-            </a:r>
-            <a:r>
-              <a:rPr lang="en-US" sz="2800" smtClean="0">
-                <a:solidFill>
-                  <a:schemeClr val="tx2"/>
-                </a:solidFill>
-              </a:rPr>
-              <a:t>localhost/AZGS_Geology/onegeologyWMS-</a:t>
-            </a:r>
-            <a:endParaRPr lang="en-US" sz="2800">
-              <a:solidFill>
-                <a:schemeClr val="tx2"/>
-              </a:solidFill>
-            </a:endParaRPr>
-          </a:p>
-          <a:p>
-            <a:pPr lvl="0"/>
-            <a:r>
-              <a:rPr lang="en-US" sz="2800"/>
-              <a:t>Restart the </a:t>
-            </a:r>
-            <a:r>
-              <a:rPr lang="en-US" sz="2800" smtClean="0"/>
-              <a:t>service</a:t>
-            </a:r>
-            <a:endParaRPr lang="en-US" sz="2800"/>
+              <a:t>/ArcGIS/services/OneGeology/AZGS_Arizona_Geology/MapServer/WMSServer"/&gt;</a:t>
+            </a:r>
+            <a:endParaRPr lang="en-US" sz="3000"/>
           </a:p>
         </p:txBody>
       </p:sp>
     </p:spTree>
     <p:extLst>
       <p:ext uri="{BB962C8B-B14F-4D97-AF65-F5344CB8AC3E}">
-        <p14:creationId xmlns:p14="http://schemas.microsoft.com/office/powerpoint/2010/main" val="3844098601"/>
+        <p14:creationId xmlns:p14="http://schemas.microsoft.com/office/powerpoint/2010/main" val="3051516479"/>
       </p:ext>
     </p:extLst>
   </p:cSld>
@@ -5147,17 +5067,19 @@
         </p:nvSpPr>
         <p:spPr/>
         <p:txBody>
-          <a:bodyPr>
-            <a:normAutofit fontScale="90000"/>
-          </a:bodyPr>
+          <a:bodyPr/>
           <a:lstStyle/>
           <a:p>
             <a:pPr algn="l"/>
             <a:r>
               <a:rPr lang="en-US" i="1" smtClean="0"/>
-              <a:t>Register Your Service with OneGeology</a:t>
-            </a:r>
-            <a:endParaRPr lang="en-US" i="1"/>
+              <a:t>Enable Custom </a:t>
+            </a:r>
+            <a:r>
+              <a:rPr lang="en-US" i="1"/>
+              <a:t>Capabilities</a:t>
+            </a:r>
+            <a:endParaRPr lang="en-US"/>
           </a:p>
         </p:txBody>
       </p:sp>
@@ -5178,84 +5100,121 @@
           </a:bodyPr>
           <a:lstStyle/>
           <a:p>
-            <a:r>
-              <a:rPr lang="en-US" smtClean="0"/>
-              <a:t>Data / Buddy Coordination Form</a:t>
-            </a:r>
-          </a:p>
-          <a:p>
-            <a:r>
-              <a:rPr lang="en-US" smtClean="0"/>
-              <a:t>Question / Answer in forum</a:t>
-            </a:r>
-          </a:p>
-          <a:p>
-            <a:r>
-              <a:rPr lang="en-US" smtClean="0"/>
-              <a:t>Email </a:t>
-            </a:r>
-            <a:r>
-              <a:rPr lang="en-US" smtClean="0">
-                <a:hlinkClick r:id="rId2"/>
+            <a:pPr lvl="0"/>
+            <a:r>
+              <a:rPr lang="en-US" sz="2800"/>
+              <a:t>Stop the service in ArcServer or ArcServer </a:t>
+            </a:r>
+            <a:r>
+              <a:rPr lang="en-US" sz="2800" smtClean="0"/>
+              <a:t>Manager</a:t>
+            </a:r>
+            <a:endParaRPr lang="en-US" sz="2800"/>
+          </a:p>
+          <a:p>
+            <a:pPr lvl="0"/>
+            <a:r>
+              <a:rPr lang="en-US" sz="2800" smtClean="0"/>
+              <a:t>Right-click </a:t>
+            </a:r>
+            <a:r>
+              <a:rPr lang="en-US" sz="2800"/>
+              <a:t>on the service and select </a:t>
+            </a:r>
+          </a:p>
+          <a:p>
+            <a:pPr marL="0" lvl="0" indent="0">
+              <a:buNone/>
+            </a:pPr>
+            <a:r>
+              <a:rPr lang="en-US" sz="2800" i="1" smtClean="0"/>
+              <a:t>Service Properties </a:t>
+            </a:r>
+            <a:endParaRPr lang="en-US" sz="2800" i="1"/>
+          </a:p>
+          <a:p>
+            <a:pPr lvl="0"/>
+            <a:r>
+              <a:rPr lang="en-US" sz="2800"/>
+              <a:t>Navigate to the </a:t>
+            </a:r>
+            <a:r>
+              <a:rPr lang="en-US" sz="2800" i="1"/>
+              <a:t>Capabilities</a:t>
+            </a:r>
+            <a:r>
+              <a:rPr lang="en-US" sz="2800"/>
+              <a:t> tab and select </a:t>
+            </a:r>
+            <a:r>
+              <a:rPr lang="en-US" sz="2800" i="1" smtClean="0"/>
+              <a:t>WMS</a:t>
+            </a:r>
+            <a:r>
+              <a:rPr lang="en-US" sz="2800" smtClean="0"/>
+              <a:t> </a:t>
+            </a:r>
+            <a:endParaRPr lang="en-US" sz="2800"/>
+          </a:p>
+          <a:p>
+            <a:pPr lvl="0"/>
+            <a:r>
+              <a:rPr lang="en-US" sz="2800"/>
+              <a:t>Select </a:t>
+            </a:r>
+            <a:r>
+              <a:rPr lang="en-US" sz="2800" i="1"/>
+              <a:t>Use External Capabilities files</a:t>
+            </a:r>
+            <a:r>
+              <a:rPr lang="en-US" sz="2800"/>
+              <a:t>. Specify the location and prefix, for example:</a:t>
+            </a:r>
+          </a:p>
+          <a:p>
+            <a:pPr marL="0" indent="0">
+              <a:buNone/>
+            </a:pPr>
+            <a:r>
+              <a:rPr lang="en-US" sz="2800">
+                <a:solidFill>
+                  <a:schemeClr val="tx2"/>
+                </a:solidFill>
               </a:rPr>
-              <a:t>onegeology@bgs.ac.uk</a:t>
-            </a:r>
-            <a:r>
-              <a:rPr lang="en-US" smtClean="0"/>
-              <a:t> with WMS URL</a:t>
-            </a:r>
-          </a:p>
-          <a:p>
-            <a:pPr lvl="1"/>
-            <a:r>
-              <a:rPr lang="en-US" smtClean="0"/>
-              <a:t>Check for naming rules</a:t>
-            </a:r>
-          </a:p>
-          <a:p>
-            <a:pPr lvl="1"/>
-            <a:r>
-              <a:rPr lang="en-US" smtClean="0"/>
-              <a:t>Technical points</a:t>
-            </a:r>
-          </a:p>
-          <a:p>
-            <a:pPr lvl="1"/>
-            <a:r>
-              <a:rPr lang="en-US" smtClean="0"/>
-              <a:t>Register service and add to Catalog</a:t>
-            </a:r>
-          </a:p>
-          <a:p>
-            <a:pPr marL="457200" lvl="1" indent="0">
-              <a:buNone/>
-            </a:pPr>
-            <a:endParaRPr lang="en-US" smtClean="0"/>
-          </a:p>
-          <a:p>
-            <a:pPr marL="57150" indent="0">
-              <a:buNone/>
-            </a:pPr>
-            <a:r>
-              <a:rPr lang="en-US" sz="2700" smtClean="0">
-                <a:hlinkClick r:id="rId3"/>
+              <a:t>http://</a:t>
+            </a:r>
+            <a:r>
+              <a:rPr lang="en-US" sz="2800" smtClean="0">
+                <a:solidFill>
+                  <a:schemeClr val="tx2"/>
+                </a:solidFill>
               </a:rPr>
-              <a:t>http://www.onegeology.com/wmsCookbook/6_1.html</a:t>
-            </a:r>
-            <a:endParaRPr lang="en-US" sz="2700" smtClean="0"/>
-          </a:p>
-          <a:p>
-            <a:pPr marL="457200" lvl="1" indent="0">
-              <a:buNone/>
-            </a:pPr>
-            <a:endParaRPr lang="en-US"/>
+              <a:t>localhost/AZGS_Geology/onegeologyWMS-</a:t>
+            </a:r>
+            <a:endParaRPr lang="en-US" sz="2800">
+              <a:solidFill>
+                <a:schemeClr val="tx2"/>
+              </a:solidFill>
+            </a:endParaRPr>
+          </a:p>
+          <a:p>
+            <a:pPr lvl="0"/>
+            <a:r>
+              <a:rPr lang="en-US" sz="2800"/>
+              <a:t>Restart the </a:t>
+            </a:r>
+            <a:r>
+              <a:rPr lang="en-US" sz="2800" smtClean="0"/>
+              <a:t>service</a:t>
+            </a:r>
+            <a:endParaRPr lang="en-US" sz="2800"/>
           </a:p>
         </p:txBody>
       </p:sp>
     </p:spTree>
     <p:extLst>
       <p:ext uri="{BB962C8B-B14F-4D97-AF65-F5344CB8AC3E}">
-        <p14:creationId xmlns:p14="http://schemas.microsoft.com/office/powerpoint/2010/main" val="2329506294"/>
+        <p14:creationId xmlns:p14="http://schemas.microsoft.com/office/powerpoint/2010/main" val="3844098601"/>
       </p:ext>
     </p:extLst>
   </p:cSld>
@@ -5457,6 +5416,153 @@
     <p:extLst>
       <p:ext uri="{BB962C8B-B14F-4D97-AF65-F5344CB8AC3E}">
         <p14:creationId xmlns:p14="http://schemas.microsoft.com/office/powerpoint/2010/main" val="3865260351"/>
+      </p:ext>
+    </p:extLst>
+  </p:cSld>
+  <p:clrMapOvr>
+    <a:masterClrMapping/>
+  </p:clrMapOvr>
+</p:sld>
+</file>
+
+<file path=ppt/slides/slide20.xml><?xml version="1.0" encoding="utf-8"?>
+<p:sld xmlns:a="http://schemas.openxmlformats.org/drawingml/2006/main" xmlns:r="http://schemas.openxmlformats.org/officeDocument/2006/relationships" xmlns:p="http://schemas.openxmlformats.org/presentationml/2006/main">
+  <p:cSld>
+    <p:spTree>
+      <p:nvGrpSpPr>
+        <p:cNvPr id="1" name=""/>
+        <p:cNvGrpSpPr/>
+        <p:nvPr/>
+      </p:nvGrpSpPr>
+      <p:grpSpPr>
+        <a:xfrm>
+          <a:off x="0" y="0"/>
+          <a:ext cx="0" cy="0"/>
+          <a:chOff x="0" y="0"/>
+          <a:chExt cx="0" cy="0"/>
+        </a:xfrm>
+      </p:grpSpPr>
+      <p:sp>
+        <p:nvSpPr>
+          <p:cNvPr id="2" name="Title 1"/>
+          <p:cNvSpPr>
+            <a:spLocks noGrp="1"/>
+          </p:cNvSpPr>
+          <p:nvPr>
+            <p:ph type="title"/>
+          </p:nvPr>
+        </p:nvSpPr>
+        <p:spPr/>
+        <p:txBody>
+          <a:bodyPr>
+            <a:normAutofit fontScale="90000"/>
+          </a:bodyPr>
+          <a:lstStyle/>
+          <a:p>
+            <a:pPr algn="l"/>
+            <a:r>
+              <a:rPr lang="en-US" i="1" smtClean="0"/>
+              <a:t>Register Your Service with OneGeology</a:t>
+            </a:r>
+            <a:endParaRPr lang="en-US" i="1"/>
+          </a:p>
+        </p:txBody>
+      </p:sp>
+      <p:sp>
+        <p:nvSpPr>
+          <p:cNvPr id="3" name="Content Placeholder 2"/>
+          <p:cNvSpPr>
+            <a:spLocks noGrp="1"/>
+          </p:cNvSpPr>
+          <p:nvPr>
+            <p:ph idx="1"/>
+          </p:nvPr>
+        </p:nvSpPr>
+        <p:spPr/>
+        <p:txBody>
+          <a:bodyPr>
+            <a:normAutofit/>
+          </a:bodyPr>
+          <a:lstStyle/>
+          <a:p>
+            <a:r>
+              <a:rPr lang="en-US" smtClean="0"/>
+              <a:t>Data / Buddy Coordination Form</a:t>
+            </a:r>
+          </a:p>
+          <a:p>
+            <a:r>
+              <a:rPr lang="en-US" smtClean="0"/>
+              <a:t>Question / Answer in forum</a:t>
+            </a:r>
+          </a:p>
+          <a:p>
+            <a:r>
+              <a:rPr lang="en-US" smtClean="0"/>
+              <a:t>Email </a:t>
+            </a:r>
+            <a:r>
+              <a:rPr lang="en-US" smtClean="0">
+                <a:hlinkClick r:id="rId2"/>
+              </a:rPr>
+              <a:t>onegeology@bgs.ac.uk</a:t>
+            </a:r>
+            <a:r>
+              <a:rPr lang="en-US" smtClean="0"/>
+              <a:t> with WMS URL</a:t>
+            </a:r>
+          </a:p>
+          <a:p>
+            <a:pPr lvl="1"/>
+            <a:r>
+              <a:rPr lang="en-US" smtClean="0"/>
+              <a:t>Check for naming rules</a:t>
+            </a:r>
+          </a:p>
+          <a:p>
+            <a:pPr lvl="1"/>
+            <a:r>
+              <a:rPr lang="en-US" smtClean="0"/>
+              <a:t>Technical points</a:t>
+            </a:r>
+          </a:p>
+          <a:p>
+            <a:pPr lvl="1"/>
+            <a:r>
+              <a:rPr lang="en-US" smtClean="0"/>
+              <a:t>Register service and add to Catalog</a:t>
+            </a:r>
+          </a:p>
+          <a:p>
+            <a:pPr marL="457200" lvl="1" indent="0">
+              <a:buNone/>
+            </a:pPr>
+            <a:endParaRPr lang="en-US" smtClean="0"/>
+          </a:p>
+          <a:p>
+            <a:pPr marL="57150" indent="0">
+              <a:buNone/>
+            </a:pPr>
+            <a:r>
+              <a:rPr lang="en-US" sz="2700" smtClean="0">
+                <a:hlinkClick r:id="rId3"/>
+              </a:rPr>
+              <a:t>http://www.onegeology.com/wmsCookbook/6_1.html</a:t>
+            </a:r>
+            <a:endParaRPr lang="en-US" sz="2700" smtClean="0"/>
+          </a:p>
+          <a:p>
+            <a:pPr marL="457200" lvl="1" indent="0">
+              <a:buNone/>
+            </a:pPr>
+            <a:endParaRPr lang="en-US"/>
+          </a:p>
+        </p:txBody>
+      </p:sp>
+    </p:spTree>
+    <p:extLst>
+      <p:ext uri="{BB962C8B-B14F-4D97-AF65-F5344CB8AC3E}">
+        <p14:creationId xmlns:p14="http://schemas.microsoft.com/office/powerpoint/2010/main" val="2329506294"/>
       </p:ext>
     </p:extLst>
   </p:cSld>
@@ -5872,7 +5978,18 @@
             </a:r>
             <a:r>
               <a:rPr lang="en-US" i="1" smtClean="0"/>
-              <a:t>service name specifications</a:t>
+              <a:t/>
+            </a:r>
+            <a:br>
+              <a:rPr lang="en-US" i="1" smtClean="0"/>
+            </a:br>
+            <a:r>
+              <a:rPr lang="en-US" i="1" smtClean="0"/>
+              <a:t>service name </a:t>
+            </a:r>
+            <a:r>
+              <a:rPr lang="en-US" i="1" smtClean="0"/>
+              <a:t>specifications</a:t>
             </a:r>
             <a:endParaRPr lang="en-US" i="1"/>
           </a:p>
@@ -6169,7 +6286,18 @@
             </a:r>
             <a:r>
               <a:rPr lang="en-US" i="1" smtClean="0"/>
-              <a:t>service name specifications</a:t>
+              <a:t/>
+            </a:r>
+            <a:br>
+              <a:rPr lang="en-US" i="1" smtClean="0"/>
+            </a:br>
+            <a:r>
+              <a:rPr lang="en-US" i="1" smtClean="0"/>
+              <a:t>service </a:t>
+            </a:r>
+            <a:r>
+              <a:rPr lang="en-US" i="1" smtClean="0"/>
+              <a:t>name specifications</a:t>
             </a:r>
             <a:endParaRPr lang="en-US" i="1"/>
           </a:p>
@@ -6335,7 +6463,18 @@
             </a:r>
             <a:r>
               <a:rPr lang="en-US" i="1" smtClean="0"/>
-              <a:t>layer name specifications</a:t>
+              <a:t/>
+            </a:r>
+            <a:br>
+              <a:rPr lang="en-US" i="1" smtClean="0"/>
+            </a:br>
+            <a:r>
+              <a:rPr lang="en-US" i="1" smtClean="0"/>
+              <a:t>layer </a:t>
+            </a:r>
+            <a:r>
+              <a:rPr lang="en-US" i="1" smtClean="0"/>
+              <a:t>name specifications</a:t>
             </a:r>
             <a:endParaRPr lang="en-US" i="1"/>
           </a:p>
@@ -6583,7 +6722,18 @@
             </a:r>
             <a:r>
               <a:rPr lang="en-US" i="1" smtClean="0"/>
-              <a:t>layer name specifications</a:t>
+              <a:t/>
+            </a:r>
+            <a:br>
+              <a:rPr lang="en-US" i="1" smtClean="0"/>
+            </a:br>
+            <a:r>
+              <a:rPr lang="en-US" i="1" smtClean="0"/>
+              <a:t>layer </a:t>
+            </a:r>
+            <a:r>
+              <a:rPr lang="en-US" i="1" smtClean="0"/>
+              <a:t>name specifications</a:t>
             </a:r>
             <a:endParaRPr lang="en-US" i="1"/>
           </a:p>

</xml_diff>